<commit_message>
alterando slides - pearson
</commit_message>
<xml_diff>
--- a/XGBOD-Seminar/XGBOD Seminar.pptx
+++ b/XGBOD-Seminar/XGBOD Seminar.pptx
@@ -4205,11 +4205,6 @@
               </a:rPr>
               <a:t>)</a:t>
             </a:r>
-            <a:endParaRPr lang="pt-BR" sz="4400" dirty="0">
-              <a:solidFill>
-                <a:schemeClr val="bg1"/>
-              </a:solidFill>
-            </a:endParaRPr>
           </a:p>
         </p:txBody>
       </p:sp>
@@ -4990,7 +4985,12 @@
             <p:ph idx="1"/>
           </p:nvPr>
         </p:nvSpPr>
-        <p:spPr/>
+        <p:spPr>
+          <a:xfrm>
+            <a:off x="838200" y="1825625"/>
+            <a:ext cx="10143478" cy="2267988"/>
+          </a:xfrm>
+        </p:spPr>
         <p:txBody>
           <a:bodyPr/>
           <a:lstStyle/>
@@ -5000,7 +5000,15 @@
             </a:pPr>
             <a:r>
               <a:rPr lang="pt-BR" dirty="0"/>
-              <a:t>3) Seleção Balanceada: Mantém o equilíbrio entre diversidade e acurácia selecionando as TOS que são ambas precisas e diversas.                                                                                                                 Para cada                           uma seleção de TOS é realizada baseada na Seleção Precisa     e para melhorar a diversidade em S, uma função que desconta acurácia é aplicada:</a:t>
+              <a:t>3) Seleção Balanceada: Mantém o equilíbrio entre diversidade e acurácia selecionando as TOS que são ambas precisas e diversas.                                                                                                                 Para cada                           uma seleção de TOS é realizada baseada na Seleção </a:t>
+            </a:r>
+            <a:r>
+              <a:rPr lang="pt-BR" dirty="0" smtClean="0"/>
+              <a:t>Precisa e </a:t>
+            </a:r>
+            <a:r>
+              <a:rPr lang="pt-BR" dirty="0"/>
+              <a:t>para melhorar a diversidade em S, uma função que desconta acurácia é aplicada:</a:t>
             </a:r>
           </a:p>
         </p:txBody>
@@ -5110,8 +5118,68 @@
         </p:blipFill>
         <p:spPr>
           <a:xfrm>
-            <a:off x="4109418" y="4183307"/>
+            <a:off x="993356" y="4093613"/>
             <a:ext cx="3973163" cy="2083350"/>
+          </a:xfrm>
+          <a:prstGeom prst="rect">
+            <a:avLst/>
+          </a:prstGeom>
+        </p:spPr>
+      </p:pic>
+      <p:pic>
+        <p:nvPicPr>
+          <p:cNvPr id="7" name="Imagem 6"/>
+          <p:cNvPicPr>
+            <a:picLocks noChangeAspect="1"/>
+          </p:cNvPicPr>
+          <p:nvPr/>
+        </p:nvPicPr>
+        <p:blipFill>
+          <a:blip r:embed="rId4">
+            <a:extLst>
+              <a:ext uri="{28A0092B-C50C-407E-A947-70E740481C1C}">
+                <a14:useLocalDpi xmlns:a14="http://schemas.microsoft.com/office/drawing/2010/main" val="0"/>
+              </a:ext>
+            </a:extLst>
+          </a:blip>
+          <a:stretch>
+            <a:fillRect/>
+          </a:stretch>
+        </p:blipFill>
+        <p:spPr>
+          <a:xfrm>
+            <a:off x="6108272" y="4323425"/>
+            <a:ext cx="5888394" cy="1132132"/>
+          </a:xfrm>
+          <a:prstGeom prst="rect">
+            <a:avLst/>
+          </a:prstGeom>
+        </p:spPr>
+      </p:pic>
+      <p:pic>
+        <p:nvPicPr>
+          <p:cNvPr id="8" name="Imagem 7"/>
+          <p:cNvPicPr>
+            <a:picLocks noChangeAspect="1"/>
+          </p:cNvPicPr>
+          <p:nvPr/>
+        </p:nvPicPr>
+        <p:blipFill>
+          <a:blip r:embed="rId5">
+            <a:extLst>
+              <a:ext uri="{28A0092B-C50C-407E-A947-70E740481C1C}">
+                <a14:useLocalDpi xmlns:a14="http://schemas.microsoft.com/office/drawing/2010/main" val="0"/>
+              </a:ext>
+            </a:extLst>
+          </a:blip>
+          <a:stretch>
+            <a:fillRect/>
+          </a:stretch>
+        </p:blipFill>
+        <p:spPr>
+          <a:xfrm>
+            <a:off x="5432394" y="4649238"/>
+            <a:ext cx="1165909" cy="323864"/>
           </a:xfrm>
           <a:prstGeom prst="rect">
             <a:avLst/>
@@ -6303,7 +6371,6 @@
               <a:rPr lang="pt-BR" dirty="0"/>
               <a:t>Motivação</a:t>
             </a:r>
-            <a:endParaRPr lang="pt-BR" dirty="0"/>
           </a:p>
         </p:txBody>
       </p:sp>

</xml_diff>

<commit_message>
XGBOD editado, slide + atual
</commit_message>
<xml_diff>
--- a/XGBOD-Seminar/XGBOD Seminar.pptx
+++ b/XGBOD-Seminar/XGBOD Seminar.pptx
@@ -5,27 +5,43 @@
     <p:sldMasterId id="2147483672" r:id="rId1"/>
   </p:sldMasterIdLst>
   <p:notesMasterIdLst>
-    <p:notesMasterId r:id="rId20"/>
+    <p:notesMasterId r:id="rId36"/>
   </p:notesMasterIdLst>
   <p:sldIdLst>
     <p:sldId id="256" r:id="rId2"/>
-    <p:sldId id="261" r:id="rId3"/>
-    <p:sldId id="267" r:id="rId4"/>
-    <p:sldId id="268" r:id="rId5"/>
-    <p:sldId id="269" r:id="rId6"/>
-    <p:sldId id="270" r:id="rId7"/>
-    <p:sldId id="271" r:id="rId8"/>
-    <p:sldId id="272" r:id="rId9"/>
-    <p:sldId id="273" r:id="rId10"/>
-    <p:sldId id="274" r:id="rId11"/>
-    <p:sldId id="275" r:id="rId12"/>
-    <p:sldId id="276" r:id="rId13"/>
-    <p:sldId id="277" r:id="rId14"/>
-    <p:sldId id="278" r:id="rId15"/>
-    <p:sldId id="279" r:id="rId16"/>
-    <p:sldId id="280" r:id="rId17"/>
-    <p:sldId id="266" r:id="rId18"/>
-    <p:sldId id="258" r:id="rId19"/>
+    <p:sldId id="281" r:id="rId3"/>
+    <p:sldId id="268" r:id="rId4"/>
+    <p:sldId id="261" r:id="rId5"/>
+    <p:sldId id="267" r:id="rId6"/>
+    <p:sldId id="269" r:id="rId7"/>
+    <p:sldId id="270" r:id="rId8"/>
+    <p:sldId id="271" r:id="rId9"/>
+    <p:sldId id="272" r:id="rId10"/>
+    <p:sldId id="273" r:id="rId11"/>
+    <p:sldId id="274" r:id="rId12"/>
+    <p:sldId id="275" r:id="rId13"/>
+    <p:sldId id="276" r:id="rId14"/>
+    <p:sldId id="277" r:id="rId15"/>
+    <p:sldId id="278" r:id="rId16"/>
+    <p:sldId id="279" r:id="rId17"/>
+    <p:sldId id="282" r:id="rId18"/>
+    <p:sldId id="280" r:id="rId19"/>
+    <p:sldId id="283" r:id="rId20"/>
+    <p:sldId id="295" r:id="rId21"/>
+    <p:sldId id="296" r:id="rId22"/>
+    <p:sldId id="290" r:id="rId23"/>
+    <p:sldId id="297" r:id="rId24"/>
+    <p:sldId id="294" r:id="rId25"/>
+    <p:sldId id="285" r:id="rId26"/>
+    <p:sldId id="292" r:id="rId27"/>
+    <p:sldId id="293" r:id="rId28"/>
+    <p:sldId id="286" r:id="rId29"/>
+    <p:sldId id="291" r:id="rId30"/>
+    <p:sldId id="289" r:id="rId31"/>
+    <p:sldId id="287" r:id="rId32"/>
+    <p:sldId id="288" r:id="rId33"/>
+    <p:sldId id="266" r:id="rId34"/>
+    <p:sldId id="258" r:id="rId35"/>
   </p:sldIdLst>
   <p:sldSz cx="12192000" cy="6858000"/>
   <p:notesSz cx="6858000" cy="9144000"/>
@@ -636,7 +652,7 @@
           <a:p>
             <a:fld id="{463941E7-EB35-4884-B9D7-7CF822459A30}" type="slidenum">
               <a:rPr lang="pt-BR" smtClean="0"/>
-              <a:t>2</a:t>
+              <a:t>4</a:t>
             </a:fld>
             <a:endParaRPr lang="pt-BR"/>
           </a:p>
@@ -720,7 +736,7 @@
           <a:p>
             <a:fld id="{463941E7-EB35-4884-B9D7-7CF822459A30}" type="slidenum">
               <a:rPr lang="pt-BR" smtClean="0"/>
-              <a:t>7</a:t>
+              <a:t>8</a:t>
             </a:fld>
             <a:endParaRPr lang="pt-BR"/>
           </a:p>
@@ -804,7 +820,7 @@
           <a:p>
             <a:fld id="{463941E7-EB35-4884-B9D7-7CF822459A30}" type="slidenum">
               <a:rPr lang="pt-BR" smtClean="0"/>
-              <a:t>14</a:t>
+              <a:t>15</a:t>
             </a:fld>
             <a:endParaRPr lang="pt-BR"/>
           </a:p>
@@ -814,6 +830,174 @@
     <p:extLst>
       <p:ext uri="{BB962C8B-B14F-4D97-AF65-F5344CB8AC3E}">
         <p14:creationId xmlns:p14="http://schemas.microsoft.com/office/powerpoint/2010/main" val="2754688498"/>
+      </p:ext>
+    </p:extLst>
+  </p:cSld>
+  <p:clrMapOvr>
+    <a:masterClrMapping/>
+  </p:clrMapOvr>
+</p:notes>
+</file>
+
+<file path=ppt/notesSlides/notesSlide5.xml><?xml version="1.0" encoding="utf-8"?>
+<p:notes xmlns:a="http://schemas.openxmlformats.org/drawingml/2006/main" xmlns:r="http://schemas.openxmlformats.org/officeDocument/2006/relationships" xmlns:p="http://schemas.openxmlformats.org/presentationml/2006/main">
+  <p:cSld>
+    <p:spTree>
+      <p:nvGrpSpPr>
+        <p:cNvPr id="1" name=""/>
+        <p:cNvGrpSpPr/>
+        <p:nvPr/>
+      </p:nvGrpSpPr>
+      <p:grpSpPr>
+        <a:xfrm>
+          <a:off x="0" y="0"/>
+          <a:ext cx="0" cy="0"/>
+          <a:chOff x="0" y="0"/>
+          <a:chExt cx="0" cy="0"/>
+        </a:xfrm>
+      </p:grpSpPr>
+      <p:sp>
+        <p:nvSpPr>
+          <p:cNvPr id="2" name="Espaço Reservado para Imagem de Slide 1"/>
+          <p:cNvSpPr>
+            <a:spLocks noGrp="1" noRot="1" noChangeAspect="1"/>
+          </p:cNvSpPr>
+          <p:nvPr>
+            <p:ph type="sldImg"/>
+          </p:nvPr>
+        </p:nvSpPr>
+        <p:spPr/>
+      </p:sp>
+      <p:sp>
+        <p:nvSpPr>
+          <p:cNvPr id="3" name="Espaço Reservado para Anotações 2"/>
+          <p:cNvSpPr>
+            <a:spLocks noGrp="1"/>
+          </p:cNvSpPr>
+          <p:nvPr>
+            <p:ph type="body" idx="1"/>
+          </p:nvPr>
+        </p:nvSpPr>
+        <p:spPr/>
+        <p:txBody>
+          <a:bodyPr/>
+          <a:lstStyle/>
+          <a:p>
+            <a:endParaRPr lang="pt-BR" dirty="0"/>
+          </a:p>
+        </p:txBody>
+      </p:sp>
+      <p:sp>
+        <p:nvSpPr>
+          <p:cNvPr id="4" name="Espaço Reservado para Número de Slide 3"/>
+          <p:cNvSpPr>
+            <a:spLocks noGrp="1"/>
+          </p:cNvSpPr>
+          <p:nvPr>
+            <p:ph type="sldNum" sz="quarter" idx="10"/>
+          </p:nvPr>
+        </p:nvSpPr>
+        <p:spPr/>
+        <p:txBody>
+          <a:bodyPr/>
+          <a:lstStyle/>
+          <a:p>
+            <a:fld id="{463941E7-EB35-4884-B9D7-7CF822459A30}" type="slidenum">
+              <a:rPr lang="pt-BR" smtClean="0"/>
+              <a:t>24</a:t>
+            </a:fld>
+            <a:endParaRPr lang="pt-BR"/>
+          </a:p>
+        </p:txBody>
+      </p:sp>
+    </p:spTree>
+    <p:extLst>
+      <p:ext uri="{BB962C8B-B14F-4D97-AF65-F5344CB8AC3E}">
+        <p14:creationId xmlns:p14="http://schemas.microsoft.com/office/powerpoint/2010/main" val="2577827005"/>
+      </p:ext>
+    </p:extLst>
+  </p:cSld>
+  <p:clrMapOvr>
+    <a:masterClrMapping/>
+  </p:clrMapOvr>
+</p:notes>
+</file>
+
+<file path=ppt/notesSlides/notesSlide6.xml><?xml version="1.0" encoding="utf-8"?>
+<p:notes xmlns:a="http://schemas.openxmlformats.org/drawingml/2006/main" xmlns:r="http://schemas.openxmlformats.org/officeDocument/2006/relationships" xmlns:p="http://schemas.openxmlformats.org/presentationml/2006/main">
+  <p:cSld>
+    <p:spTree>
+      <p:nvGrpSpPr>
+        <p:cNvPr id="1" name=""/>
+        <p:cNvGrpSpPr/>
+        <p:nvPr/>
+      </p:nvGrpSpPr>
+      <p:grpSpPr>
+        <a:xfrm>
+          <a:off x="0" y="0"/>
+          <a:ext cx="0" cy="0"/>
+          <a:chOff x="0" y="0"/>
+          <a:chExt cx="0" cy="0"/>
+        </a:xfrm>
+      </p:grpSpPr>
+      <p:sp>
+        <p:nvSpPr>
+          <p:cNvPr id="2" name="Espaço Reservado para Imagem de Slide 1"/>
+          <p:cNvSpPr>
+            <a:spLocks noGrp="1" noRot="1" noChangeAspect="1"/>
+          </p:cNvSpPr>
+          <p:nvPr>
+            <p:ph type="sldImg"/>
+          </p:nvPr>
+        </p:nvSpPr>
+        <p:spPr/>
+      </p:sp>
+      <p:sp>
+        <p:nvSpPr>
+          <p:cNvPr id="3" name="Espaço Reservado para Anotações 2"/>
+          <p:cNvSpPr>
+            <a:spLocks noGrp="1"/>
+          </p:cNvSpPr>
+          <p:nvPr>
+            <p:ph type="body" idx="1"/>
+          </p:nvPr>
+        </p:nvSpPr>
+        <p:spPr/>
+        <p:txBody>
+          <a:bodyPr/>
+          <a:lstStyle/>
+          <a:p>
+            <a:endParaRPr lang="pt-BR" dirty="0"/>
+          </a:p>
+        </p:txBody>
+      </p:sp>
+      <p:sp>
+        <p:nvSpPr>
+          <p:cNvPr id="4" name="Espaço Reservado para Número de Slide 3"/>
+          <p:cNvSpPr>
+            <a:spLocks noGrp="1"/>
+          </p:cNvSpPr>
+          <p:nvPr>
+            <p:ph type="sldNum" sz="quarter" idx="10"/>
+          </p:nvPr>
+        </p:nvSpPr>
+        <p:spPr/>
+        <p:txBody>
+          <a:bodyPr/>
+          <a:lstStyle/>
+          <a:p>
+            <a:fld id="{463941E7-EB35-4884-B9D7-7CF822459A30}" type="slidenum">
+              <a:rPr lang="pt-BR" smtClean="0"/>
+              <a:t>32</a:t>
+            </a:fld>
+            <a:endParaRPr lang="pt-BR"/>
+          </a:p>
+        </p:txBody>
+      </p:sp>
+    </p:spTree>
+    <p:extLst>
+      <p:ext uri="{BB962C8B-B14F-4D97-AF65-F5344CB8AC3E}">
+        <p14:creationId xmlns:p14="http://schemas.microsoft.com/office/powerpoint/2010/main" val="559546306"/>
       </p:ext>
     </p:extLst>
   </p:cSld>
@@ -4501,6 +4685,118 @@
       </p:grpSpPr>
       <p:sp>
         <p:nvSpPr>
+          <p:cNvPr id="3" name="Espaço Reservado para Número de Slide 2"/>
+          <p:cNvSpPr>
+            <a:spLocks noGrp="1"/>
+          </p:cNvSpPr>
+          <p:nvPr>
+            <p:ph type="sldNum" sz="quarter" idx="12"/>
+          </p:nvPr>
+        </p:nvSpPr>
+        <p:spPr/>
+        <p:txBody>
+          <a:bodyPr/>
+          <a:lstStyle/>
+          <a:p>
+            <a:fld id="{60345120-F3F8-44AB-A502-72CB2236A7D5}" type="slidenum">
+              <a:rPr lang="pt-BR" smtClean="0"/>
+              <a:t>10</a:t>
+            </a:fld>
+            <a:endParaRPr lang="pt-BR"/>
+          </a:p>
+        </p:txBody>
+      </p:sp>
+      <p:sp>
+        <p:nvSpPr>
+          <p:cNvPr id="4" name="Título 3"/>
+          <p:cNvSpPr>
+            <a:spLocks noGrp="1"/>
+          </p:cNvSpPr>
+          <p:nvPr>
+            <p:ph type="title"/>
+          </p:nvPr>
+        </p:nvSpPr>
+        <p:spPr/>
+        <p:txBody>
+          <a:bodyPr/>
+          <a:lstStyle/>
+          <a:p>
+            <a:r>
+              <a:rPr lang="pt-BR" dirty="0"/>
+              <a:t>Fase 2: Seleção TOS</a:t>
+            </a:r>
+          </a:p>
+        </p:txBody>
+      </p:sp>
+      <p:pic>
+        <p:nvPicPr>
+          <p:cNvPr id="5" name="Imagem 4"/>
+          <p:cNvPicPr>
+            <a:picLocks noChangeAspect="1"/>
+          </p:cNvPicPr>
+          <p:nvPr/>
+        </p:nvPicPr>
+        <p:blipFill>
+          <a:blip r:embed="rId2">
+            <a:extLst>
+              <a:ext uri="{28A0092B-C50C-407E-A947-70E740481C1C}">
+                <a14:useLocalDpi xmlns:a14="http://schemas.microsoft.com/office/drawing/2010/main" val="0"/>
+              </a:ext>
+            </a:extLst>
+          </a:blip>
+          <a:stretch>
+            <a:fillRect/>
+          </a:stretch>
+        </p:blipFill>
+        <p:spPr>
+          <a:xfrm>
+            <a:off x="2603786" y="2192958"/>
+            <a:ext cx="6984427" cy="3876110"/>
+          </a:xfrm>
+          <a:prstGeom prst="rect">
+            <a:avLst/>
+          </a:prstGeom>
+        </p:spPr>
+      </p:pic>
+    </p:spTree>
+    <p:extLst>
+      <p:ext uri="{BB962C8B-B14F-4D97-AF65-F5344CB8AC3E}">
+        <p14:creationId xmlns:p14="http://schemas.microsoft.com/office/powerpoint/2010/main" val="2286226953"/>
+      </p:ext>
+    </p:extLst>
+  </p:cSld>
+  <p:clrMapOvr>
+    <a:masterClrMapping/>
+  </p:clrMapOvr>
+  <p:timing>
+    <p:tnLst>
+      <p:par>
+        <p:cTn id="1" dur="indefinite" restart="never" nodeType="tmRoot"/>
+      </p:par>
+    </p:tnLst>
+  </p:timing>
+</p:sld>
+</file>
+
+<file path=ppt/slides/slide11.xml><?xml version="1.0" encoding="utf-8"?>
+<p:sld xmlns:a="http://schemas.openxmlformats.org/drawingml/2006/main" xmlns:r="http://schemas.openxmlformats.org/officeDocument/2006/relationships" xmlns:p="http://schemas.openxmlformats.org/presentationml/2006/main">
+  <p:cSld>
+    <p:spTree>
+      <p:nvGrpSpPr>
+        <p:cNvPr id="1" name=""/>
+        <p:cNvGrpSpPr/>
+        <p:nvPr/>
+      </p:nvGrpSpPr>
+      <p:grpSpPr>
+        <a:xfrm>
+          <a:off x="0" y="0"/>
+          <a:ext cx="0" cy="0"/>
+          <a:chOff x="0" y="0"/>
+          <a:chExt cx="0" cy="0"/>
+        </a:xfrm>
+      </p:grpSpPr>
+      <p:sp>
+        <p:nvSpPr>
           <p:cNvPr id="2" name="Espaço Reservado para Conteúdo 1"/>
           <p:cNvSpPr>
             <a:spLocks noGrp="1"/>
@@ -4610,7 +4906,7 @@
           <a:p>
             <a:fld id="{60345120-F3F8-44AB-A502-72CB2236A7D5}" type="slidenum">
               <a:rPr lang="pt-BR" smtClean="0"/>
-              <a:t>10</a:t>
+              <a:t>11</a:t>
             </a:fld>
             <a:endParaRPr lang="pt-BR"/>
           </a:p>
@@ -4778,7 +5074,7 @@
 </p:sld>
 </file>
 
-<file path=ppt/slides/slide11.xml><?xml version="1.0" encoding="utf-8"?>
+<file path=ppt/slides/slide12.xml><?xml version="1.0" encoding="utf-8"?>
 <p:sld xmlns:a="http://schemas.openxmlformats.org/drawingml/2006/main" xmlns:r="http://schemas.openxmlformats.org/officeDocument/2006/relationships" xmlns:p="http://schemas.openxmlformats.org/presentationml/2006/main">
   <p:cSld>
     <p:spTree>
@@ -4881,7 +5177,7 @@
           <a:p>
             <a:fld id="{60345120-F3F8-44AB-A502-72CB2236A7D5}" type="slidenum">
               <a:rPr lang="pt-BR" smtClean="0"/>
-              <a:t>11</a:t>
+              <a:t>12</a:t>
             </a:fld>
             <a:endParaRPr lang="pt-BR"/>
           </a:p>
@@ -4959,7 +5255,7 @@
 </p:sld>
 </file>
 
-<file path=ppt/slides/slide12.xml><?xml version="1.0" encoding="utf-8"?>
+<file path=ppt/slides/slide13.xml><?xml version="1.0" encoding="utf-8"?>
 <p:sld xmlns:a="http://schemas.openxmlformats.org/drawingml/2006/main" xmlns:r="http://schemas.openxmlformats.org/officeDocument/2006/relationships" xmlns:p="http://schemas.openxmlformats.org/presentationml/2006/main">
   <p:cSld>
     <p:spTree>
@@ -5026,7 +5322,7 @@
           <a:p>
             <a:fld id="{60345120-F3F8-44AB-A502-72CB2236A7D5}" type="slidenum">
               <a:rPr lang="pt-BR" smtClean="0"/>
-              <a:t>12</a:t>
+              <a:t>13</a:t>
             </a:fld>
             <a:endParaRPr lang="pt-BR"/>
           </a:p>
@@ -5142,7 +5438,7 @@
 </p:sld>
 </file>
 
-<file path=ppt/slides/slide13.xml><?xml version="1.0" encoding="utf-8"?>
+<file path=ppt/slides/slide14.xml><?xml version="1.0" encoding="utf-8"?>
 <p:sld xmlns:a="http://schemas.openxmlformats.org/drawingml/2006/main" xmlns:r="http://schemas.openxmlformats.org/officeDocument/2006/relationships" xmlns:p="http://schemas.openxmlformats.org/presentationml/2006/main">
   <p:cSld>
     <p:spTree>
@@ -5176,7 +5472,7 @@
           <a:p>
             <a:fld id="{60345120-F3F8-44AB-A502-72CB2236A7D5}" type="slidenum">
               <a:rPr lang="pt-BR" smtClean="0"/>
-              <a:t>13</a:t>
+              <a:t>14</a:t>
             </a:fld>
             <a:endParaRPr lang="pt-BR"/>
           </a:p>
@@ -5236,7 +5532,7 @@
         </p:blipFill>
         <p:spPr>
           <a:xfrm>
-            <a:off x="3633749" y="1826200"/>
+            <a:off x="3282056" y="1826200"/>
             <a:ext cx="4924502" cy="4895275"/>
           </a:xfrm>
           <a:prstGeom prst="rect">
@@ -5244,6 +5540,36 @@
           </a:prstGeom>
         </p:spPr>
       </p:pic>
+      <p:sp>
+        <p:nvSpPr>
+          <p:cNvPr id="2" name="CaixaDeTexto 1"/>
+          <p:cNvSpPr txBox="1"/>
+          <p:nvPr/>
+        </p:nvSpPr>
+        <p:spPr>
+          <a:xfrm>
+            <a:off x="8610600" y="6259810"/>
+            <a:ext cx="1617785" cy="461665"/>
+          </a:xfrm>
+          <a:prstGeom prst="rect">
+            <a:avLst/>
+          </a:prstGeom>
+          <a:noFill/>
+        </p:spPr>
+        <p:txBody>
+          <a:bodyPr wrap="square" rtlCol="0">
+            <a:spAutoFit/>
+          </a:bodyPr>
+          <a:lstStyle/>
+          <a:p>
+            <a:r>
+              <a:rPr lang="pt-BR" sz="2400" dirty="0" smtClean="0"/>
+              <a:t>O(K*p)</a:t>
+            </a:r>
+            <a:endParaRPr lang="pt-BR" sz="2400" dirty="0"/>
+          </a:p>
+        </p:txBody>
+      </p:sp>
     </p:spTree>
     <p:extLst>
       <p:ext uri="{BB962C8B-B14F-4D97-AF65-F5344CB8AC3E}">
@@ -5264,7 +5590,7 @@
 </p:sld>
 </file>
 
-<file path=ppt/slides/slide14.xml><?xml version="1.0" encoding="utf-8"?>
+<file path=ppt/slides/slide15.xml><?xml version="1.0" encoding="utf-8"?>
 <p:sld xmlns:a="http://schemas.openxmlformats.org/drawingml/2006/main" xmlns:r="http://schemas.openxmlformats.org/officeDocument/2006/relationships" xmlns:p="http://schemas.openxmlformats.org/presentationml/2006/main">
   <p:cSld>
     <p:spTree>
@@ -5348,7 +5674,7 @@
           <a:p>
             <a:fld id="{60345120-F3F8-44AB-A502-72CB2236A7D5}" type="slidenum">
               <a:rPr lang="pt-BR" smtClean="0"/>
-              <a:t>14</a:t>
+              <a:t>15</a:t>
             </a:fld>
             <a:endParaRPr lang="pt-BR"/>
           </a:p>
@@ -5491,7 +5817,7 @@
 </p:sld>
 </file>
 
-<file path=ppt/slides/slide15.xml><?xml version="1.0" encoding="utf-8"?>
+<file path=ppt/slides/slide16.xml><?xml version="1.0" encoding="utf-8"?>
 <p:sld xmlns:a="http://schemas.openxmlformats.org/drawingml/2006/main" xmlns:r="http://schemas.openxmlformats.org/officeDocument/2006/relationships" xmlns:p="http://schemas.openxmlformats.org/presentationml/2006/main">
   <p:cSld>
     <p:spTree>
@@ -5525,7 +5851,7 @@
           <a:p>
             <a:fld id="{60345120-F3F8-44AB-A502-72CB2236A7D5}" type="slidenum">
               <a:rPr lang="pt-BR" smtClean="0"/>
-              <a:t>15</a:t>
+              <a:t>16</a:t>
             </a:fld>
             <a:endParaRPr lang="pt-BR"/>
           </a:p>
@@ -5608,7 +5934,7 @@
 </p:sld>
 </file>
 
-<file path=ppt/slides/slide16.xml><?xml version="1.0" encoding="utf-8"?>
+<file path=ppt/slides/slide17.xml><?xml version="1.0" encoding="utf-8"?>
 <p:sld xmlns:a="http://schemas.openxmlformats.org/drawingml/2006/main" xmlns:r="http://schemas.openxmlformats.org/officeDocument/2006/relationships" xmlns:p="http://schemas.openxmlformats.org/presentationml/2006/main">
   <p:cSld>
     <p:spTree>
@@ -5627,6 +5953,118 @@
       </p:grpSpPr>
       <p:sp>
         <p:nvSpPr>
+          <p:cNvPr id="2" name="Espaço Reservado para Conteúdo 1"/>
+          <p:cNvSpPr>
+            <a:spLocks noGrp="1"/>
+          </p:cNvSpPr>
+          <p:nvPr>
+            <p:ph idx="1"/>
+          </p:nvPr>
+        </p:nvSpPr>
+        <p:spPr>
+          <a:xfrm>
+            <a:off x="838200" y="2085975"/>
+            <a:ext cx="10515600" cy="4270375"/>
+          </a:xfrm>
+        </p:spPr>
+        <p:txBody>
+          <a:bodyPr>
+            <a:normAutofit/>
+          </a:bodyPr>
+          <a:lstStyle/>
+          <a:p>
+            <a:r>
+              <a:rPr lang="pt-BR" dirty="0" smtClean="0"/>
+              <a:t>Design voltado para performance</a:t>
+            </a:r>
+          </a:p>
+          <a:p>
+            <a:pPr lvl="1"/>
+            <a:r>
+              <a:rPr lang="pt-BR" dirty="0" smtClean="0"/>
+              <a:t>Processamento paralelo</a:t>
+            </a:r>
+            <a:endParaRPr lang="pt-BR" dirty="0"/>
+          </a:p>
+          <a:p>
+            <a:r>
+              <a:rPr lang="pt-BR" dirty="0" smtClean="0"/>
+              <a:t>Conhecido como campeão de desafios no </a:t>
+            </a:r>
+            <a:r>
+              <a:rPr lang="pt-BR" dirty="0" err="1" smtClean="0"/>
+              <a:t>Kaggle</a:t>
+            </a:r>
+            <a:endParaRPr lang="pt-BR" dirty="0" smtClean="0"/>
+          </a:p>
+          <a:p>
+            <a:r>
+              <a:rPr lang="pt-BR" dirty="0" smtClean="0"/>
+              <a:t>Lida bem com </a:t>
+            </a:r>
+            <a:r>
+              <a:rPr lang="pt-BR" dirty="0" err="1" smtClean="0"/>
+              <a:t>datasets</a:t>
+            </a:r>
+            <a:r>
+              <a:rPr lang="pt-BR" dirty="0" smtClean="0"/>
+              <a:t> desbalanceados</a:t>
+            </a:r>
+            <a:endParaRPr lang="pt-BR" dirty="0"/>
+          </a:p>
+          <a:p>
+            <a:r>
+              <a:rPr lang="pt-BR" dirty="0" smtClean="0"/>
+              <a:t>Utiliza um termo de regularização para penalizar funções de alta complexidade (evita </a:t>
+            </a:r>
+            <a:r>
+              <a:rPr lang="pt-BR" dirty="0" err="1" smtClean="0"/>
+              <a:t>overfitting</a:t>
+            </a:r>
+            <a:r>
+              <a:rPr lang="pt-BR" dirty="0" smtClean="0"/>
+              <a:t>)</a:t>
+            </a:r>
+          </a:p>
+          <a:p>
+            <a:r>
+              <a:rPr lang="pt-BR" dirty="0" smtClean="0"/>
+              <a:t>Capaz de gerar </a:t>
+            </a:r>
+            <a:r>
+              <a:rPr lang="pt-BR" i="1" dirty="0" err="1" smtClean="0"/>
+              <a:t>feature</a:t>
+            </a:r>
+            <a:r>
+              <a:rPr lang="pt-BR" i="1" dirty="0" smtClean="0"/>
+              <a:t> </a:t>
+            </a:r>
+            <a:r>
+              <a:rPr lang="pt-BR" i="1" dirty="0" err="1" smtClean="0"/>
+              <a:t>importance</a:t>
+            </a:r>
+            <a:r>
+              <a:rPr lang="pt-BR" dirty="0" smtClean="0"/>
+              <a:t> do modelo</a:t>
+            </a:r>
+          </a:p>
+          <a:p>
+            <a:endParaRPr lang="pt-BR" dirty="0"/>
+          </a:p>
+          <a:p>
+            <a:pPr marL="0" indent="0" algn="ctr">
+              <a:buNone/>
+            </a:pPr>
+            <a:r>
+              <a:rPr lang="pt-BR" sz="2000" dirty="0" smtClean="0"/>
+              <a:t>*Notar que outro algoritmo poderia ser utilizado como classificador final</a:t>
+            </a:r>
+            <a:endParaRPr lang="pt-BR" dirty="0" smtClean="0"/>
+          </a:p>
+        </p:txBody>
+      </p:sp>
+      <p:sp>
+        <p:nvSpPr>
           <p:cNvPr id="3" name="Espaço Reservado para Número de Slide 2"/>
           <p:cNvSpPr>
             <a:spLocks noGrp="1"/>
@@ -5642,7 +6080,7 @@
           <a:p>
             <a:fld id="{60345120-F3F8-44AB-A502-72CB2236A7D5}" type="slidenum">
               <a:rPr lang="pt-BR" smtClean="0"/>
-              <a:t>16</a:t>
+              <a:t>17</a:t>
             </a:fld>
             <a:endParaRPr lang="pt-BR"/>
           </a:p>
@@ -5664,8 +6102,92 @@
           <a:lstStyle/>
           <a:p>
             <a:r>
+              <a:rPr lang="pt-BR" dirty="0" err="1" smtClean="0"/>
+              <a:t>XGBoost</a:t>
+            </a:r>
+            <a:endParaRPr lang="pt-BR" dirty="0"/>
+          </a:p>
+        </p:txBody>
+      </p:sp>
+    </p:spTree>
+    <p:extLst>
+      <p:ext uri="{BB962C8B-B14F-4D97-AF65-F5344CB8AC3E}">
+        <p14:creationId xmlns:p14="http://schemas.microsoft.com/office/powerpoint/2010/main" val="3389468420"/>
+      </p:ext>
+    </p:extLst>
+  </p:cSld>
+  <p:clrMapOvr>
+    <a:masterClrMapping/>
+  </p:clrMapOvr>
+</p:sld>
+</file>
+
+<file path=ppt/slides/slide18.xml><?xml version="1.0" encoding="utf-8"?>
+<p:sld xmlns:a="http://schemas.openxmlformats.org/drawingml/2006/main" xmlns:r="http://schemas.openxmlformats.org/officeDocument/2006/relationships" xmlns:p="http://schemas.openxmlformats.org/presentationml/2006/main">
+  <p:cSld>
+    <p:spTree>
+      <p:nvGrpSpPr>
+        <p:cNvPr id="1" name=""/>
+        <p:cNvGrpSpPr/>
+        <p:nvPr/>
+      </p:nvGrpSpPr>
+      <p:grpSpPr>
+        <a:xfrm>
+          <a:off x="0" y="0"/>
+          <a:ext cx="0" cy="0"/>
+          <a:chOff x="0" y="0"/>
+          <a:chExt cx="0" cy="0"/>
+        </a:xfrm>
+      </p:grpSpPr>
+      <p:sp>
+        <p:nvSpPr>
+          <p:cNvPr id="3" name="Espaço Reservado para Número de Slide 2"/>
+          <p:cNvSpPr>
+            <a:spLocks noGrp="1"/>
+          </p:cNvSpPr>
+          <p:nvPr>
+            <p:ph type="sldNum" sz="quarter" idx="12"/>
+          </p:nvPr>
+        </p:nvSpPr>
+        <p:spPr/>
+        <p:txBody>
+          <a:bodyPr/>
+          <a:lstStyle/>
+          <a:p>
+            <a:fld id="{60345120-F3F8-44AB-A502-72CB2236A7D5}" type="slidenum">
+              <a:rPr lang="pt-BR" smtClean="0"/>
+              <a:t>18</a:t>
+            </a:fld>
+            <a:endParaRPr lang="pt-BR"/>
+          </a:p>
+        </p:txBody>
+      </p:sp>
+      <p:sp>
+        <p:nvSpPr>
+          <p:cNvPr id="4" name="Título 3"/>
+          <p:cNvSpPr>
+            <a:spLocks noGrp="1"/>
+          </p:cNvSpPr>
+          <p:nvPr>
+            <p:ph type="title"/>
+          </p:nvPr>
+        </p:nvSpPr>
+        <p:spPr/>
+        <p:txBody>
+          <a:bodyPr/>
+          <a:lstStyle/>
+          <a:p>
+            <a:r>
+              <a:rPr lang="pt-BR" dirty="0" err="1" smtClean="0"/>
+              <a:t>XGBoost</a:t>
+            </a:r>
+            <a:r>
               <a:rPr lang="pt-BR" dirty="0" smtClean="0"/>
-              <a:t>Visão Geral</a:t>
+              <a:t>: Visão </a:t>
+            </a:r>
+            <a:r>
+              <a:rPr lang="pt-BR" dirty="0" smtClean="0"/>
+              <a:t>Geral</a:t>
             </a:r>
             <a:endParaRPr lang="pt-BR" dirty="0"/>
           </a:p>
@@ -5725,7 +6247,7 @@
 </p:sld>
 </file>
 
-<file path=ppt/slides/slide17.xml><?xml version="1.0" encoding="utf-8"?>
+<file path=ppt/slides/slide19.xml><?xml version="1.0" encoding="utf-8"?>
 <p:sld xmlns:a="http://schemas.openxmlformats.org/drawingml/2006/main" xmlns:r="http://schemas.openxmlformats.org/officeDocument/2006/relationships" xmlns:p="http://schemas.openxmlformats.org/presentationml/2006/main">
   <p:cSld>
     <p:spTree>
@@ -5744,6 +6266,2813 @@
       </p:grpSpPr>
       <p:sp>
         <p:nvSpPr>
+          <p:cNvPr id="2" name="Espaço Reservado para Conteúdo 1"/>
+          <p:cNvSpPr>
+            <a:spLocks noGrp="1"/>
+          </p:cNvSpPr>
+          <p:nvPr>
+            <p:ph idx="1"/>
+          </p:nvPr>
+        </p:nvSpPr>
+        <p:spPr>
+          <a:xfrm>
+            <a:off x="838200" y="1825624"/>
+            <a:ext cx="10515600" cy="4530725"/>
+          </a:xfrm>
+        </p:spPr>
+        <p:txBody>
+          <a:bodyPr>
+            <a:normAutofit/>
+          </a:bodyPr>
+          <a:lstStyle/>
+          <a:p>
+            <a:r>
+              <a:rPr lang="pt-BR" dirty="0" smtClean="0"/>
+              <a:t>Dois experimentos:</a:t>
+            </a:r>
+          </a:p>
+          <a:p>
+            <a:pPr lvl="1"/>
+            <a:r>
+              <a:rPr lang="pt-BR" dirty="0" smtClean="0"/>
+              <a:t>Experimento 1: Compara a utilização de todos ou nenhum TOS</a:t>
+            </a:r>
+          </a:p>
+          <a:p>
+            <a:pPr lvl="1"/>
+            <a:r>
+              <a:rPr lang="pt-BR" dirty="0" smtClean="0"/>
+              <a:t>Experimento 2: Compara o tipo de seleção de TOS aplicado</a:t>
+            </a:r>
+          </a:p>
+          <a:p>
+            <a:pPr lvl="1"/>
+            <a:endParaRPr lang="pt-BR" dirty="0"/>
+          </a:p>
+          <a:p>
+            <a:r>
+              <a:rPr lang="pt-BR" dirty="0" smtClean="0"/>
+              <a:t>7 </a:t>
+            </a:r>
+            <a:r>
+              <a:rPr lang="pt-BR" dirty="0" err="1" smtClean="0"/>
+              <a:t>datasets</a:t>
+            </a:r>
+            <a:endParaRPr lang="pt-BR" dirty="0"/>
+          </a:p>
+          <a:p>
+            <a:pPr lvl="1"/>
+            <a:r>
+              <a:rPr lang="pt-BR" sz="1800" dirty="0" err="1" smtClean="0"/>
+              <a:t>Arrhythmia</a:t>
+            </a:r>
+            <a:endParaRPr lang="pt-BR" sz="1800" dirty="0" smtClean="0"/>
+          </a:p>
+          <a:p>
+            <a:pPr lvl="1"/>
+            <a:r>
+              <a:rPr lang="pt-BR" sz="1800" dirty="0" err="1" smtClean="0"/>
+              <a:t>Letter</a:t>
+            </a:r>
+            <a:endParaRPr lang="pt-BR" sz="1800" dirty="0" smtClean="0"/>
+          </a:p>
+          <a:p>
+            <a:pPr lvl="1"/>
+            <a:r>
+              <a:rPr lang="pt-BR" sz="1800" dirty="0" err="1" smtClean="0"/>
+              <a:t>Cardio</a:t>
+            </a:r>
+            <a:endParaRPr lang="pt-BR" sz="1800" dirty="0" smtClean="0"/>
+          </a:p>
+          <a:p>
+            <a:pPr lvl="1"/>
+            <a:r>
+              <a:rPr lang="pt-BR" sz="1800" dirty="0" err="1" smtClean="0"/>
+              <a:t>Speench</a:t>
+            </a:r>
+            <a:endParaRPr lang="pt-BR" sz="1800" dirty="0" smtClean="0"/>
+          </a:p>
+          <a:p>
+            <a:pPr lvl="1"/>
+            <a:r>
+              <a:rPr lang="pt-BR" sz="1800" dirty="0" err="1" smtClean="0"/>
+              <a:t>Satellite</a:t>
+            </a:r>
+            <a:endParaRPr lang="pt-BR" sz="1800" dirty="0" smtClean="0"/>
+          </a:p>
+          <a:p>
+            <a:pPr lvl="1"/>
+            <a:r>
+              <a:rPr lang="pt-BR" sz="1800" dirty="0" err="1" smtClean="0"/>
+              <a:t>Mnist</a:t>
+            </a:r>
+            <a:endParaRPr lang="pt-BR" sz="1800" dirty="0" smtClean="0"/>
+          </a:p>
+          <a:p>
+            <a:pPr lvl="1"/>
+            <a:r>
+              <a:rPr lang="pt-BR" sz="1800" dirty="0" err="1" smtClean="0"/>
+              <a:t>Mammography</a:t>
+            </a:r>
+            <a:endParaRPr lang="pt-BR" sz="1800" dirty="0" smtClean="0"/>
+          </a:p>
+        </p:txBody>
+      </p:sp>
+      <p:sp>
+        <p:nvSpPr>
+          <p:cNvPr id="3" name="Espaço Reservado para Número de Slide 2"/>
+          <p:cNvSpPr>
+            <a:spLocks noGrp="1"/>
+          </p:cNvSpPr>
+          <p:nvPr>
+            <p:ph type="sldNum" sz="quarter" idx="12"/>
+          </p:nvPr>
+        </p:nvSpPr>
+        <p:spPr/>
+        <p:txBody>
+          <a:bodyPr/>
+          <a:lstStyle/>
+          <a:p>
+            <a:fld id="{60345120-F3F8-44AB-A502-72CB2236A7D5}" type="slidenum">
+              <a:rPr lang="pt-BR" smtClean="0"/>
+              <a:t>19</a:t>
+            </a:fld>
+            <a:endParaRPr lang="pt-BR"/>
+          </a:p>
+        </p:txBody>
+      </p:sp>
+      <p:sp>
+        <p:nvSpPr>
+          <p:cNvPr id="4" name="Título 3"/>
+          <p:cNvSpPr>
+            <a:spLocks noGrp="1"/>
+          </p:cNvSpPr>
+          <p:nvPr>
+            <p:ph type="title"/>
+          </p:nvPr>
+        </p:nvSpPr>
+        <p:spPr/>
+        <p:txBody>
+          <a:bodyPr/>
+          <a:lstStyle/>
+          <a:p>
+            <a:r>
+              <a:rPr lang="pt-BR" dirty="0" smtClean="0"/>
+              <a:t>Experimentos</a:t>
+            </a:r>
+            <a:endParaRPr lang="pt-BR" dirty="0"/>
+          </a:p>
+        </p:txBody>
+      </p:sp>
+    </p:spTree>
+    <p:extLst>
+      <p:ext uri="{BB962C8B-B14F-4D97-AF65-F5344CB8AC3E}">
+        <p14:creationId xmlns:p14="http://schemas.microsoft.com/office/powerpoint/2010/main" val="3887992395"/>
+      </p:ext>
+    </p:extLst>
+  </p:cSld>
+  <p:clrMapOvr>
+    <a:masterClrMapping/>
+  </p:clrMapOvr>
+</p:sld>
+</file>
+
+<file path=ppt/slides/slide2.xml><?xml version="1.0" encoding="utf-8"?>
+<p:sld xmlns:a="http://schemas.openxmlformats.org/drawingml/2006/main" xmlns:r="http://schemas.openxmlformats.org/officeDocument/2006/relationships" xmlns:p="http://schemas.openxmlformats.org/presentationml/2006/main">
+  <p:cSld>
+    <p:spTree>
+      <p:nvGrpSpPr>
+        <p:cNvPr id="1" name=""/>
+        <p:cNvGrpSpPr/>
+        <p:nvPr/>
+      </p:nvGrpSpPr>
+      <p:grpSpPr>
+        <a:xfrm>
+          <a:off x="0" y="0"/>
+          <a:ext cx="0" cy="0"/>
+          <a:chOff x="0" y="0"/>
+          <a:chExt cx="0" cy="0"/>
+        </a:xfrm>
+      </p:grpSpPr>
+      <p:sp>
+        <p:nvSpPr>
+          <p:cNvPr id="2" name="Espaço Reservado para Conteúdo 1"/>
+          <p:cNvSpPr>
+            <a:spLocks noGrp="1"/>
+          </p:cNvSpPr>
+          <p:nvPr>
+            <p:ph idx="1"/>
+          </p:nvPr>
+        </p:nvSpPr>
+        <p:spPr>
+          <a:xfrm>
+            <a:off x="838200" y="2356338"/>
+            <a:ext cx="10515600" cy="3762009"/>
+          </a:xfrm>
+        </p:spPr>
+        <p:txBody>
+          <a:bodyPr>
+            <a:normAutofit/>
+          </a:bodyPr>
+          <a:lstStyle/>
+          <a:p>
+            <a:pPr marL="0" indent="0" algn="ctr">
+              <a:buNone/>
+            </a:pPr>
+            <a:r>
+              <a:rPr lang="pt-BR" sz="3600" dirty="0" smtClean="0"/>
+              <a:t>XGBOD: </a:t>
+            </a:r>
+            <a:r>
+              <a:rPr lang="pt-BR" sz="3600" dirty="0" err="1" smtClean="0"/>
+              <a:t>Improving</a:t>
+            </a:r>
+            <a:r>
+              <a:rPr lang="pt-BR" sz="3600" dirty="0" smtClean="0"/>
+              <a:t> </a:t>
+            </a:r>
+            <a:r>
+              <a:rPr lang="pt-BR" sz="3600" dirty="0" err="1" smtClean="0"/>
+              <a:t>Supervised</a:t>
+            </a:r>
+            <a:r>
+              <a:rPr lang="pt-BR" sz="3600" dirty="0" smtClean="0"/>
+              <a:t> </a:t>
+            </a:r>
+            <a:r>
+              <a:rPr lang="pt-BR" sz="3600" dirty="0" err="1" smtClean="0"/>
+              <a:t>Outlier</a:t>
+            </a:r>
+            <a:r>
+              <a:rPr lang="pt-BR" sz="3600" dirty="0" smtClean="0"/>
+              <a:t> </a:t>
+            </a:r>
+            <a:r>
+              <a:rPr lang="pt-BR" sz="3600" dirty="0" err="1" smtClean="0"/>
+              <a:t>Detection</a:t>
+            </a:r>
+            <a:r>
+              <a:rPr lang="pt-BR" sz="3600" dirty="0" smtClean="0"/>
+              <a:t> </a:t>
+            </a:r>
+            <a:r>
+              <a:rPr lang="pt-BR" sz="3600" dirty="0" err="1" smtClean="0"/>
+              <a:t>with</a:t>
+            </a:r>
+            <a:r>
+              <a:rPr lang="pt-BR" sz="3600" dirty="0" smtClean="0"/>
+              <a:t> </a:t>
+            </a:r>
+            <a:r>
+              <a:rPr lang="pt-BR" sz="3600" dirty="0" err="1" smtClean="0"/>
+              <a:t>Unsupervised</a:t>
+            </a:r>
+            <a:r>
+              <a:rPr lang="pt-BR" sz="3600" dirty="0" smtClean="0"/>
+              <a:t> </a:t>
+            </a:r>
+            <a:r>
+              <a:rPr lang="pt-BR" sz="3600" dirty="0" err="1" smtClean="0"/>
+              <a:t>Representation</a:t>
+            </a:r>
+            <a:r>
+              <a:rPr lang="pt-BR" sz="3600" dirty="0" smtClean="0"/>
+              <a:t> Learning</a:t>
+            </a:r>
+          </a:p>
+          <a:p>
+            <a:pPr marL="0" indent="0" algn="ctr">
+              <a:buNone/>
+            </a:pPr>
+            <a:endParaRPr lang="pt-BR" sz="3200" dirty="0"/>
+          </a:p>
+          <a:p>
+            <a:pPr marL="0" indent="0" algn="ctr">
+              <a:buNone/>
+            </a:pPr>
+            <a:r>
+              <a:rPr lang="pt-BR" dirty="0" err="1" smtClean="0"/>
+              <a:t>Yue</a:t>
+            </a:r>
+            <a:r>
+              <a:rPr lang="pt-BR" dirty="0" smtClean="0"/>
+              <a:t> </a:t>
+            </a:r>
+            <a:r>
+              <a:rPr lang="pt-BR" dirty="0" err="1" smtClean="0"/>
+              <a:t>Zhao</a:t>
+            </a:r>
+            <a:r>
+              <a:rPr lang="pt-BR" dirty="0" smtClean="0"/>
+              <a:t> </a:t>
+            </a:r>
+            <a:r>
+              <a:rPr lang="pt-BR" dirty="0" err="1" smtClean="0"/>
+              <a:t>and</a:t>
+            </a:r>
+            <a:r>
+              <a:rPr lang="pt-BR" dirty="0" smtClean="0"/>
+              <a:t> </a:t>
+            </a:r>
+            <a:r>
+              <a:rPr lang="pt-BR" dirty="0" err="1" smtClean="0"/>
+              <a:t>Maciej</a:t>
+            </a:r>
+            <a:r>
+              <a:rPr lang="pt-BR" dirty="0" smtClean="0"/>
+              <a:t> K. (Toronto, Canadá)</a:t>
+            </a:r>
+          </a:p>
+          <a:p>
+            <a:pPr marL="0" indent="0" algn="ctr">
+              <a:buNone/>
+            </a:pPr>
+            <a:endParaRPr lang="pt-BR" dirty="0"/>
+          </a:p>
+          <a:p>
+            <a:pPr marL="0" indent="0" algn="ctr">
+              <a:buNone/>
+            </a:pPr>
+            <a:r>
+              <a:rPr lang="pt-BR" dirty="0" smtClean="0"/>
+              <a:t>IJCNN: </a:t>
+            </a:r>
+            <a:r>
+              <a:rPr lang="pt-BR" dirty="0" err="1" smtClean="0"/>
+              <a:t>International</a:t>
+            </a:r>
+            <a:r>
+              <a:rPr lang="pt-BR" dirty="0" smtClean="0"/>
+              <a:t> </a:t>
+            </a:r>
+            <a:r>
+              <a:rPr lang="pt-BR" dirty="0" err="1" smtClean="0"/>
+              <a:t>Conference</a:t>
+            </a:r>
+            <a:r>
+              <a:rPr lang="pt-BR" dirty="0" smtClean="0"/>
+              <a:t> </a:t>
+            </a:r>
+            <a:r>
+              <a:rPr lang="pt-BR" dirty="0" err="1" smtClean="0"/>
+              <a:t>on</a:t>
+            </a:r>
+            <a:r>
+              <a:rPr lang="pt-BR" dirty="0" smtClean="0"/>
+              <a:t> Neural Networks (2018)</a:t>
+            </a:r>
+            <a:endParaRPr lang="pt-BR" dirty="0"/>
+          </a:p>
+        </p:txBody>
+      </p:sp>
+      <p:sp>
+        <p:nvSpPr>
+          <p:cNvPr id="3" name="Espaço Reservado para Número de Slide 2"/>
+          <p:cNvSpPr>
+            <a:spLocks noGrp="1"/>
+          </p:cNvSpPr>
+          <p:nvPr>
+            <p:ph type="sldNum" sz="quarter" idx="12"/>
+          </p:nvPr>
+        </p:nvSpPr>
+        <p:spPr/>
+        <p:txBody>
+          <a:bodyPr/>
+          <a:lstStyle/>
+          <a:p>
+            <a:fld id="{60345120-F3F8-44AB-A502-72CB2236A7D5}" type="slidenum">
+              <a:rPr lang="pt-BR" smtClean="0"/>
+              <a:t>2</a:t>
+            </a:fld>
+            <a:endParaRPr lang="pt-BR"/>
+          </a:p>
+        </p:txBody>
+      </p:sp>
+      <p:sp>
+        <p:nvSpPr>
+          <p:cNvPr id="4" name="Título 3"/>
+          <p:cNvSpPr>
+            <a:spLocks noGrp="1"/>
+          </p:cNvSpPr>
+          <p:nvPr>
+            <p:ph type="title"/>
+          </p:nvPr>
+        </p:nvSpPr>
+        <p:spPr/>
+        <p:txBody>
+          <a:bodyPr/>
+          <a:lstStyle/>
+          <a:p>
+            <a:r>
+              <a:rPr lang="pt-BR" dirty="0" smtClean="0"/>
+              <a:t>Apresentação do Artigo</a:t>
+            </a:r>
+            <a:endParaRPr lang="pt-BR" dirty="0"/>
+          </a:p>
+        </p:txBody>
+      </p:sp>
+    </p:spTree>
+    <p:extLst>
+      <p:ext uri="{BB962C8B-B14F-4D97-AF65-F5344CB8AC3E}">
+        <p14:creationId xmlns:p14="http://schemas.microsoft.com/office/powerpoint/2010/main" val="1349494555"/>
+      </p:ext>
+    </p:extLst>
+  </p:cSld>
+  <p:clrMapOvr>
+    <a:masterClrMapping/>
+  </p:clrMapOvr>
+</p:sld>
+</file>
+
+<file path=ppt/slides/slide20.xml><?xml version="1.0" encoding="utf-8"?>
+<p:sld xmlns:a="http://schemas.openxmlformats.org/drawingml/2006/main" xmlns:r="http://schemas.openxmlformats.org/officeDocument/2006/relationships" xmlns:p="http://schemas.openxmlformats.org/presentationml/2006/main">
+  <p:cSld>
+    <p:spTree>
+      <p:nvGrpSpPr>
+        <p:cNvPr id="1" name=""/>
+        <p:cNvGrpSpPr/>
+        <p:nvPr/>
+      </p:nvGrpSpPr>
+      <p:grpSpPr>
+        <a:xfrm>
+          <a:off x="0" y="0"/>
+          <a:ext cx="0" cy="0"/>
+          <a:chOff x="0" y="0"/>
+          <a:chExt cx="0" cy="0"/>
+        </a:xfrm>
+      </p:grpSpPr>
+      <p:sp>
+        <p:nvSpPr>
+          <p:cNvPr id="2" name="Espaço Reservado para Conteúdo 1"/>
+          <p:cNvSpPr>
+            <a:spLocks noGrp="1"/>
+          </p:cNvSpPr>
+          <p:nvPr>
+            <p:ph idx="1"/>
+          </p:nvPr>
+        </p:nvSpPr>
+        <p:spPr/>
+        <p:txBody>
+          <a:bodyPr/>
+          <a:lstStyle/>
+          <a:p>
+            <a:endParaRPr lang="pt-BR"/>
+          </a:p>
+        </p:txBody>
+      </p:sp>
+      <p:sp>
+        <p:nvSpPr>
+          <p:cNvPr id="3" name="Espaço Reservado para Número de Slide 2"/>
+          <p:cNvSpPr>
+            <a:spLocks noGrp="1"/>
+          </p:cNvSpPr>
+          <p:nvPr>
+            <p:ph type="sldNum" sz="quarter" idx="12"/>
+          </p:nvPr>
+        </p:nvSpPr>
+        <p:spPr/>
+        <p:txBody>
+          <a:bodyPr/>
+          <a:lstStyle/>
+          <a:p>
+            <a:fld id="{60345120-F3F8-44AB-A502-72CB2236A7D5}" type="slidenum">
+              <a:rPr lang="pt-BR" smtClean="0"/>
+              <a:t>20</a:t>
+            </a:fld>
+            <a:endParaRPr lang="pt-BR"/>
+          </a:p>
+        </p:txBody>
+      </p:sp>
+      <p:sp>
+        <p:nvSpPr>
+          <p:cNvPr id="4" name="Título 3"/>
+          <p:cNvSpPr>
+            <a:spLocks noGrp="1"/>
+          </p:cNvSpPr>
+          <p:nvPr>
+            <p:ph type="title"/>
+          </p:nvPr>
+        </p:nvSpPr>
+        <p:spPr/>
+        <p:txBody>
+          <a:bodyPr/>
+          <a:lstStyle/>
+          <a:p>
+            <a:r>
+              <a:rPr lang="pt-BR" dirty="0" smtClean="0"/>
+              <a:t>Experimento 1: Resultados</a:t>
+            </a:r>
+            <a:endParaRPr lang="pt-BR" dirty="0"/>
+          </a:p>
+        </p:txBody>
+      </p:sp>
+    </p:spTree>
+    <p:extLst>
+      <p:ext uri="{BB962C8B-B14F-4D97-AF65-F5344CB8AC3E}">
+        <p14:creationId xmlns:p14="http://schemas.microsoft.com/office/powerpoint/2010/main" val="2080773877"/>
+      </p:ext>
+    </p:extLst>
+  </p:cSld>
+  <p:clrMapOvr>
+    <a:masterClrMapping/>
+  </p:clrMapOvr>
+</p:sld>
+</file>
+
+<file path=ppt/slides/slide21.xml><?xml version="1.0" encoding="utf-8"?>
+<p:sld xmlns:a="http://schemas.openxmlformats.org/drawingml/2006/main" xmlns:r="http://schemas.openxmlformats.org/officeDocument/2006/relationships" xmlns:p="http://schemas.openxmlformats.org/presentationml/2006/main">
+  <p:cSld>
+    <p:spTree>
+      <p:nvGrpSpPr>
+        <p:cNvPr id="1" name=""/>
+        <p:cNvGrpSpPr/>
+        <p:nvPr/>
+      </p:nvGrpSpPr>
+      <p:grpSpPr>
+        <a:xfrm>
+          <a:off x="0" y="0"/>
+          <a:ext cx="0" cy="0"/>
+          <a:chOff x="0" y="0"/>
+          <a:chExt cx="0" cy="0"/>
+        </a:xfrm>
+      </p:grpSpPr>
+      <p:sp>
+        <p:nvSpPr>
+          <p:cNvPr id="2" name="Espaço Reservado para Conteúdo 1"/>
+          <p:cNvSpPr>
+            <a:spLocks noGrp="1"/>
+          </p:cNvSpPr>
+          <p:nvPr>
+            <p:ph idx="1"/>
+          </p:nvPr>
+        </p:nvSpPr>
+        <p:spPr/>
+        <p:txBody>
+          <a:bodyPr/>
+          <a:lstStyle/>
+          <a:p>
+            <a:endParaRPr lang="pt-BR"/>
+          </a:p>
+        </p:txBody>
+      </p:sp>
+      <p:sp>
+        <p:nvSpPr>
+          <p:cNvPr id="3" name="Espaço Reservado para Número de Slide 2"/>
+          <p:cNvSpPr>
+            <a:spLocks noGrp="1"/>
+          </p:cNvSpPr>
+          <p:nvPr>
+            <p:ph type="sldNum" sz="quarter" idx="12"/>
+          </p:nvPr>
+        </p:nvSpPr>
+        <p:spPr/>
+        <p:txBody>
+          <a:bodyPr/>
+          <a:lstStyle/>
+          <a:p>
+            <a:fld id="{60345120-F3F8-44AB-A502-72CB2236A7D5}" type="slidenum">
+              <a:rPr lang="pt-BR" smtClean="0"/>
+              <a:t>21</a:t>
+            </a:fld>
+            <a:endParaRPr lang="pt-BR"/>
+          </a:p>
+        </p:txBody>
+      </p:sp>
+      <p:sp>
+        <p:nvSpPr>
+          <p:cNvPr id="4" name="Título 3"/>
+          <p:cNvSpPr>
+            <a:spLocks noGrp="1"/>
+          </p:cNvSpPr>
+          <p:nvPr>
+            <p:ph type="title"/>
+          </p:nvPr>
+        </p:nvSpPr>
+        <p:spPr/>
+        <p:txBody>
+          <a:bodyPr/>
+          <a:lstStyle/>
+          <a:p>
+            <a:r>
+              <a:rPr lang="pt-BR" dirty="0" smtClean="0"/>
+              <a:t>Experimento 2 - Resultados</a:t>
+            </a:r>
+            <a:endParaRPr lang="pt-BR" dirty="0"/>
+          </a:p>
+        </p:txBody>
+      </p:sp>
+    </p:spTree>
+    <p:extLst>
+      <p:ext uri="{BB962C8B-B14F-4D97-AF65-F5344CB8AC3E}">
+        <p14:creationId xmlns:p14="http://schemas.microsoft.com/office/powerpoint/2010/main" val="4059273292"/>
+      </p:ext>
+    </p:extLst>
+  </p:cSld>
+  <p:clrMapOvr>
+    <a:masterClrMapping/>
+  </p:clrMapOvr>
+</p:sld>
+</file>
+
+<file path=ppt/slides/slide22.xml><?xml version="1.0" encoding="utf-8"?>
+<p:sld xmlns:a="http://schemas.openxmlformats.org/drawingml/2006/main" xmlns:r="http://schemas.openxmlformats.org/officeDocument/2006/relationships" xmlns:p="http://schemas.openxmlformats.org/presentationml/2006/main">
+  <p:cSld>
+    <p:spTree>
+      <p:nvGrpSpPr>
+        <p:cNvPr id="1" name=""/>
+        <p:cNvGrpSpPr/>
+        <p:nvPr/>
+      </p:nvGrpSpPr>
+      <p:grpSpPr>
+        <a:xfrm>
+          <a:off x="0" y="0"/>
+          <a:ext cx="0" cy="0"/>
+          <a:chOff x="0" y="0"/>
+          <a:chExt cx="0" cy="0"/>
+        </a:xfrm>
+      </p:grpSpPr>
+      <p:sp>
+        <p:nvSpPr>
+          <p:cNvPr id="2" name="Espaço Reservado para Conteúdo 1"/>
+          <p:cNvSpPr>
+            <a:spLocks noGrp="1"/>
+          </p:cNvSpPr>
+          <p:nvPr>
+            <p:ph idx="1"/>
+          </p:nvPr>
+        </p:nvSpPr>
+        <p:spPr/>
+        <p:txBody>
+          <a:bodyPr/>
+          <a:lstStyle/>
+          <a:p>
+            <a:endParaRPr lang="pt-BR" dirty="0"/>
+          </a:p>
+        </p:txBody>
+      </p:sp>
+      <p:sp>
+        <p:nvSpPr>
+          <p:cNvPr id="3" name="Espaço Reservado para Número de Slide 2"/>
+          <p:cNvSpPr>
+            <a:spLocks noGrp="1"/>
+          </p:cNvSpPr>
+          <p:nvPr>
+            <p:ph type="sldNum" sz="quarter" idx="12"/>
+          </p:nvPr>
+        </p:nvSpPr>
+        <p:spPr/>
+        <p:txBody>
+          <a:bodyPr/>
+          <a:lstStyle/>
+          <a:p>
+            <a:fld id="{60345120-F3F8-44AB-A502-72CB2236A7D5}" type="slidenum">
+              <a:rPr lang="pt-BR" smtClean="0"/>
+              <a:t>22</a:t>
+            </a:fld>
+            <a:endParaRPr lang="pt-BR"/>
+          </a:p>
+        </p:txBody>
+      </p:sp>
+      <p:sp>
+        <p:nvSpPr>
+          <p:cNvPr id="4" name="Título 3"/>
+          <p:cNvSpPr>
+            <a:spLocks noGrp="1"/>
+          </p:cNvSpPr>
+          <p:nvPr>
+            <p:ph type="title"/>
+          </p:nvPr>
+        </p:nvSpPr>
+        <p:spPr/>
+        <p:txBody>
+          <a:bodyPr/>
+          <a:lstStyle/>
+          <a:p>
+            <a:r>
+              <a:rPr lang="pt-BR" dirty="0" smtClean="0"/>
+              <a:t>Conclusões empíricas</a:t>
+            </a:r>
+            <a:endParaRPr lang="pt-BR" dirty="0"/>
+          </a:p>
+        </p:txBody>
+      </p:sp>
+    </p:spTree>
+    <p:extLst>
+      <p:ext uri="{BB962C8B-B14F-4D97-AF65-F5344CB8AC3E}">
+        <p14:creationId xmlns:p14="http://schemas.microsoft.com/office/powerpoint/2010/main" val="700432198"/>
+      </p:ext>
+    </p:extLst>
+  </p:cSld>
+  <p:clrMapOvr>
+    <a:masterClrMapping/>
+  </p:clrMapOvr>
+  <p:timing>
+    <p:tnLst>
+      <p:par>
+        <p:cTn id="1" dur="indefinite" restart="never" nodeType="tmRoot"/>
+      </p:par>
+    </p:tnLst>
+  </p:timing>
+</p:sld>
+</file>
+
+<file path=ppt/slides/slide23.xml><?xml version="1.0" encoding="utf-8"?>
+<p:sld xmlns:a="http://schemas.openxmlformats.org/drawingml/2006/main" xmlns:r="http://schemas.openxmlformats.org/officeDocument/2006/relationships" xmlns:p="http://schemas.openxmlformats.org/presentationml/2006/main">
+  <p:cSld>
+    <p:spTree>
+      <p:nvGrpSpPr>
+        <p:cNvPr id="1" name=""/>
+        <p:cNvGrpSpPr/>
+        <p:nvPr/>
+      </p:nvGrpSpPr>
+      <p:grpSpPr>
+        <a:xfrm>
+          <a:off x="0" y="0"/>
+          <a:ext cx="0" cy="0"/>
+          <a:chOff x="0" y="0"/>
+          <a:chExt cx="0" cy="0"/>
+        </a:xfrm>
+      </p:grpSpPr>
+      <p:sp>
+        <p:nvSpPr>
+          <p:cNvPr id="2" name="Espaço Reservado para Conteúdo 1"/>
+          <p:cNvSpPr>
+            <a:spLocks noGrp="1"/>
+          </p:cNvSpPr>
+          <p:nvPr>
+            <p:ph idx="1"/>
+          </p:nvPr>
+        </p:nvSpPr>
+        <p:spPr/>
+        <p:txBody>
+          <a:bodyPr/>
+          <a:lstStyle/>
+          <a:p>
+            <a:endParaRPr lang="pt-BR"/>
+          </a:p>
+        </p:txBody>
+      </p:sp>
+      <p:sp>
+        <p:nvSpPr>
+          <p:cNvPr id="3" name="Espaço Reservado para Número de Slide 2"/>
+          <p:cNvSpPr>
+            <a:spLocks noGrp="1"/>
+          </p:cNvSpPr>
+          <p:nvPr>
+            <p:ph type="sldNum" sz="quarter" idx="12"/>
+          </p:nvPr>
+        </p:nvSpPr>
+        <p:spPr/>
+        <p:txBody>
+          <a:bodyPr/>
+          <a:lstStyle/>
+          <a:p>
+            <a:fld id="{60345120-F3F8-44AB-A502-72CB2236A7D5}" type="slidenum">
+              <a:rPr lang="pt-BR" smtClean="0"/>
+              <a:t>23</a:t>
+            </a:fld>
+            <a:endParaRPr lang="pt-BR"/>
+          </a:p>
+        </p:txBody>
+      </p:sp>
+      <p:sp>
+        <p:nvSpPr>
+          <p:cNvPr id="4" name="Título 3"/>
+          <p:cNvSpPr>
+            <a:spLocks noGrp="1"/>
+          </p:cNvSpPr>
+          <p:nvPr>
+            <p:ph type="title"/>
+          </p:nvPr>
+        </p:nvSpPr>
+        <p:spPr/>
+        <p:txBody>
+          <a:bodyPr/>
+          <a:lstStyle/>
+          <a:p>
+            <a:r>
+              <a:rPr lang="pt-BR" dirty="0" smtClean="0"/>
+              <a:t>Limitações e trabalhos futuros</a:t>
+            </a:r>
+            <a:endParaRPr lang="pt-BR" dirty="0"/>
+          </a:p>
+        </p:txBody>
+      </p:sp>
+    </p:spTree>
+    <p:extLst>
+      <p:ext uri="{BB962C8B-B14F-4D97-AF65-F5344CB8AC3E}">
+        <p14:creationId xmlns:p14="http://schemas.microsoft.com/office/powerpoint/2010/main" val="1892163488"/>
+      </p:ext>
+    </p:extLst>
+  </p:cSld>
+  <p:clrMapOvr>
+    <a:masterClrMapping/>
+  </p:clrMapOvr>
+</p:sld>
+</file>
+
+<file path=ppt/slides/slide24.xml><?xml version="1.0" encoding="utf-8"?>
+<p:sld xmlns:a="http://schemas.openxmlformats.org/drawingml/2006/main" xmlns:r="http://schemas.openxmlformats.org/officeDocument/2006/relationships" xmlns:p="http://schemas.openxmlformats.org/presentationml/2006/main">
+  <p:cSld>
+    <p:spTree>
+      <p:nvGrpSpPr>
+        <p:cNvPr id="1" name=""/>
+        <p:cNvGrpSpPr/>
+        <p:nvPr/>
+      </p:nvGrpSpPr>
+      <p:grpSpPr>
+        <a:xfrm>
+          <a:off x="0" y="0"/>
+          <a:ext cx="0" cy="0"/>
+          <a:chOff x="0" y="0"/>
+          <a:chExt cx="0" cy="0"/>
+        </a:xfrm>
+      </p:grpSpPr>
+      <p:sp>
+        <p:nvSpPr>
+          <p:cNvPr id="3" name="Espaço Reservado para Número de Slide 2"/>
+          <p:cNvSpPr>
+            <a:spLocks noGrp="1"/>
+          </p:cNvSpPr>
+          <p:nvPr>
+            <p:ph type="sldNum" sz="quarter" idx="12"/>
+          </p:nvPr>
+        </p:nvSpPr>
+        <p:spPr/>
+        <p:txBody>
+          <a:bodyPr/>
+          <a:lstStyle/>
+          <a:p>
+            <a:fld id="{60345120-F3F8-44AB-A502-72CB2236A7D5}" type="slidenum">
+              <a:rPr lang="pt-BR" smtClean="0"/>
+              <a:t>24</a:t>
+            </a:fld>
+            <a:endParaRPr lang="pt-BR"/>
+          </a:p>
+        </p:txBody>
+      </p:sp>
+      <p:sp>
+        <p:nvSpPr>
+          <p:cNvPr id="4" name="Título 3"/>
+          <p:cNvSpPr>
+            <a:spLocks noGrp="1"/>
+          </p:cNvSpPr>
+          <p:nvPr>
+            <p:ph type="title"/>
+          </p:nvPr>
+        </p:nvSpPr>
+        <p:spPr/>
+        <p:txBody>
+          <a:bodyPr/>
+          <a:lstStyle/>
+          <a:p>
+            <a:r>
+              <a:rPr lang="pt-BR" dirty="0" smtClean="0"/>
+              <a:t>Implementação </a:t>
+            </a:r>
+            <a:r>
+              <a:rPr lang="pt-BR" dirty="0" err="1" smtClean="0"/>
+              <a:t>PyOD</a:t>
+            </a:r>
+            <a:r>
+              <a:rPr lang="pt-BR" dirty="0" smtClean="0"/>
+              <a:t>: Parâmetros</a:t>
+            </a:r>
+            <a:endParaRPr lang="pt-BR" dirty="0"/>
+          </a:p>
+        </p:txBody>
+      </p:sp>
+      <p:grpSp>
+        <p:nvGrpSpPr>
+          <p:cNvPr id="7" name="Grupo 6"/>
+          <p:cNvGrpSpPr/>
+          <p:nvPr/>
+        </p:nvGrpSpPr>
+        <p:grpSpPr>
+          <a:xfrm>
+            <a:off x="9618509" y="2719948"/>
+            <a:ext cx="2286001" cy="1723292"/>
+            <a:chOff x="7772399" y="3434862"/>
+            <a:chExt cx="2286001" cy="1723292"/>
+          </a:xfrm>
+        </p:grpSpPr>
+        <p:sp>
+          <p:nvSpPr>
+            <p:cNvPr id="5" name="Texto explicativo em forma de nuvem 4"/>
+            <p:cNvSpPr/>
+            <p:nvPr/>
+          </p:nvSpPr>
+          <p:spPr>
+            <a:xfrm>
+              <a:off x="7772399" y="3434862"/>
+              <a:ext cx="2286001" cy="1723292"/>
+            </a:xfrm>
+            <a:prstGeom prst="cloudCallout">
+              <a:avLst>
+                <a:gd name="adj1" fmla="val -68013"/>
+                <a:gd name="adj2" fmla="val 49575"/>
+              </a:avLst>
+            </a:prstGeom>
+            <a:solidFill>
+              <a:srgbClr val="404040"/>
+            </a:solidFill>
+            <a:ln>
+              <a:solidFill>
+                <a:schemeClr val="bg1"/>
+              </a:solidFill>
+            </a:ln>
+          </p:spPr>
+          <p:style>
+            <a:lnRef idx="2">
+              <a:schemeClr val="accent1">
+                <a:shade val="50000"/>
+              </a:schemeClr>
+            </a:lnRef>
+            <a:fillRef idx="1">
+              <a:schemeClr val="accent1"/>
+            </a:fillRef>
+            <a:effectRef idx="0">
+              <a:schemeClr val="accent1"/>
+            </a:effectRef>
+            <a:fontRef idx="minor">
+              <a:schemeClr val="lt1"/>
+            </a:fontRef>
+          </p:style>
+          <p:txBody>
+            <a:bodyPr rtlCol="0" anchor="ctr"/>
+            <a:lstStyle/>
+            <a:p>
+              <a:pPr algn="ctr"/>
+              <a:endParaRPr lang="pt-BR"/>
+            </a:p>
+          </p:txBody>
+        </p:sp>
+        <p:sp>
+          <p:nvSpPr>
+            <p:cNvPr id="6" name="Retângulo 5"/>
+            <p:cNvSpPr/>
+            <p:nvPr/>
+          </p:nvSpPr>
+          <p:spPr>
+            <a:xfrm>
+              <a:off x="8146050" y="4029781"/>
+              <a:ext cx="1550425" cy="523220"/>
+            </a:xfrm>
+            <a:prstGeom prst="rect">
+              <a:avLst/>
+            </a:prstGeom>
+          </p:spPr>
+          <p:txBody>
+            <a:bodyPr wrap="none">
+              <a:spAutoFit/>
+            </a:bodyPr>
+            <a:lstStyle/>
+            <a:p>
+              <a:pPr algn="ctr"/>
+              <a:r>
+                <a:rPr lang="pt-BR" sz="2800" i="1" dirty="0">
+                  <a:solidFill>
+                    <a:schemeClr val="bg1"/>
+                  </a:solidFill>
+                </a:rPr>
+                <a:t>Cadê o r?</a:t>
+              </a:r>
+              <a:endParaRPr lang="pt-BR" sz="2800" i="1" dirty="0">
+                <a:solidFill>
+                  <a:schemeClr val="bg1"/>
+                </a:solidFill>
+              </a:endParaRPr>
+            </a:p>
+          </p:txBody>
+        </p:sp>
+      </p:grpSp>
+      <p:pic>
+        <p:nvPicPr>
+          <p:cNvPr id="8" name="Imagem 7"/>
+          <p:cNvPicPr>
+            <a:picLocks noChangeAspect="1"/>
+          </p:cNvPicPr>
+          <p:nvPr/>
+        </p:nvPicPr>
+        <p:blipFill>
+          <a:blip r:embed="rId3"/>
+          <a:stretch>
+            <a:fillRect/>
+          </a:stretch>
+        </p:blipFill>
+        <p:spPr>
+          <a:xfrm>
+            <a:off x="1142725" y="2494279"/>
+            <a:ext cx="7679166" cy="2174631"/>
+          </a:xfrm>
+          <a:prstGeom prst="roundRect">
+            <a:avLst>
+              <a:gd name="adj" fmla="val 8594"/>
+            </a:avLst>
+          </a:prstGeom>
+          <a:solidFill>
+            <a:srgbClr val="FFFFFF">
+              <a:shade val="85000"/>
+            </a:srgbClr>
+          </a:solidFill>
+          <a:ln>
+            <a:noFill/>
+          </a:ln>
+          <a:effectLst/>
+        </p:spPr>
+      </p:pic>
+      <p:sp>
+        <p:nvSpPr>
+          <p:cNvPr id="9" name="Espaço Reservado para Conteúdo 1"/>
+          <p:cNvSpPr txBox="1">
+            <a:spLocks/>
+          </p:cNvSpPr>
+          <p:nvPr/>
+        </p:nvSpPr>
+        <p:spPr>
+          <a:xfrm>
+            <a:off x="1142724" y="4952114"/>
+            <a:ext cx="7679167" cy="900479"/>
+          </a:xfrm>
+          <a:prstGeom prst="rect">
+            <a:avLst/>
+          </a:prstGeom>
+        </p:spPr>
+        <p:txBody>
+          <a:bodyPr vert="horz" lIns="91440" tIns="45720" rIns="91440" bIns="45720" rtlCol="0">
+            <a:normAutofit/>
+          </a:bodyPr>
+          <a:lstStyle>
+            <a:lvl1pPr marL="228600" indent="-228600" algn="l" defTabSz="914400" rtl="0" eaLnBrk="1" latinLnBrk="0" hangingPunct="1">
+              <a:lnSpc>
+                <a:spcPct val="90000"/>
+              </a:lnSpc>
+              <a:spcBef>
+                <a:spcPts val="1000"/>
+              </a:spcBef>
+              <a:buFont typeface="Arial" panose="020B0604020202020204" pitchFamily="34" charset="0"/>
+              <a:buChar char="•"/>
+              <a:defRPr sz="2800" kern="1200">
+                <a:solidFill>
+                  <a:schemeClr val="tx1"/>
+                </a:solidFill>
+                <a:latin typeface="+mn-lt"/>
+                <a:ea typeface="+mn-ea"/>
+                <a:cs typeface="+mn-cs"/>
+              </a:defRPr>
+            </a:lvl1pPr>
+            <a:lvl2pPr marL="685800" indent="-228600" algn="l" defTabSz="914400" rtl="0" eaLnBrk="1" latinLnBrk="0" hangingPunct="1">
+              <a:lnSpc>
+                <a:spcPct val="90000"/>
+              </a:lnSpc>
+              <a:spcBef>
+                <a:spcPts val="500"/>
+              </a:spcBef>
+              <a:buFont typeface="Arial" panose="020B0604020202020204" pitchFamily="34" charset="0"/>
+              <a:buChar char="•"/>
+              <a:defRPr sz="2400" kern="1200">
+                <a:solidFill>
+                  <a:schemeClr val="tx1"/>
+                </a:solidFill>
+                <a:latin typeface="+mn-lt"/>
+                <a:ea typeface="+mn-ea"/>
+                <a:cs typeface="+mn-cs"/>
+              </a:defRPr>
+            </a:lvl2pPr>
+            <a:lvl3pPr marL="1143000" indent="-228600" algn="l" defTabSz="914400" rtl="0" eaLnBrk="1" latinLnBrk="0" hangingPunct="1">
+              <a:lnSpc>
+                <a:spcPct val="90000"/>
+              </a:lnSpc>
+              <a:spcBef>
+                <a:spcPts val="500"/>
+              </a:spcBef>
+              <a:buFont typeface="Arial" panose="020B0604020202020204" pitchFamily="34" charset="0"/>
+              <a:buChar char="•"/>
+              <a:defRPr sz="2000" kern="1200">
+                <a:solidFill>
+                  <a:schemeClr val="tx1"/>
+                </a:solidFill>
+                <a:latin typeface="+mn-lt"/>
+                <a:ea typeface="+mn-ea"/>
+                <a:cs typeface="+mn-cs"/>
+              </a:defRPr>
+            </a:lvl3pPr>
+            <a:lvl4pPr marL="1600200" indent="-228600" algn="l" defTabSz="914400" rtl="0" eaLnBrk="1" latinLnBrk="0" hangingPunct="1">
+              <a:lnSpc>
+                <a:spcPct val="90000"/>
+              </a:lnSpc>
+              <a:spcBef>
+                <a:spcPts val="500"/>
+              </a:spcBef>
+              <a:buFont typeface="Arial" panose="020B0604020202020204" pitchFamily="34" charset="0"/>
+              <a:buChar char="•"/>
+              <a:defRPr sz="1800" kern="1200">
+                <a:solidFill>
+                  <a:schemeClr val="tx1"/>
+                </a:solidFill>
+                <a:latin typeface="+mn-lt"/>
+                <a:ea typeface="+mn-ea"/>
+                <a:cs typeface="+mn-cs"/>
+              </a:defRPr>
+            </a:lvl4pPr>
+            <a:lvl5pPr marL="2057400" indent="-228600" algn="l" defTabSz="914400" rtl="0" eaLnBrk="1" latinLnBrk="0" hangingPunct="1">
+              <a:lnSpc>
+                <a:spcPct val="90000"/>
+              </a:lnSpc>
+              <a:spcBef>
+                <a:spcPts val="500"/>
+              </a:spcBef>
+              <a:buFont typeface="Arial" panose="020B0604020202020204" pitchFamily="34" charset="0"/>
+              <a:buChar char="•"/>
+              <a:defRPr sz="1800" kern="1200">
+                <a:solidFill>
+                  <a:schemeClr val="tx1"/>
+                </a:solidFill>
+                <a:latin typeface="+mn-lt"/>
+                <a:ea typeface="+mn-ea"/>
+                <a:cs typeface="+mn-cs"/>
+              </a:defRPr>
+            </a:lvl5pPr>
+            <a:lvl6pPr marL="2514600" indent="-228600" algn="l" defTabSz="914400" rtl="0" eaLnBrk="1" latinLnBrk="0" hangingPunct="1">
+              <a:lnSpc>
+                <a:spcPct val="90000"/>
+              </a:lnSpc>
+              <a:spcBef>
+                <a:spcPts val="500"/>
+              </a:spcBef>
+              <a:buFont typeface="Arial" panose="020B0604020202020204" pitchFamily="34" charset="0"/>
+              <a:buChar char="•"/>
+              <a:defRPr sz="1800" kern="1200">
+                <a:solidFill>
+                  <a:schemeClr val="tx1"/>
+                </a:solidFill>
+                <a:latin typeface="+mn-lt"/>
+                <a:ea typeface="+mn-ea"/>
+                <a:cs typeface="+mn-cs"/>
+              </a:defRPr>
+            </a:lvl6pPr>
+            <a:lvl7pPr marL="2971800" indent="-228600" algn="l" defTabSz="914400" rtl="0" eaLnBrk="1" latinLnBrk="0" hangingPunct="1">
+              <a:lnSpc>
+                <a:spcPct val="90000"/>
+              </a:lnSpc>
+              <a:spcBef>
+                <a:spcPts val="500"/>
+              </a:spcBef>
+              <a:buFont typeface="Arial" panose="020B0604020202020204" pitchFamily="34" charset="0"/>
+              <a:buChar char="•"/>
+              <a:defRPr sz="1800" kern="1200">
+                <a:solidFill>
+                  <a:schemeClr val="tx1"/>
+                </a:solidFill>
+                <a:latin typeface="+mn-lt"/>
+                <a:ea typeface="+mn-ea"/>
+                <a:cs typeface="+mn-cs"/>
+              </a:defRPr>
+            </a:lvl7pPr>
+            <a:lvl8pPr marL="3429000" indent="-228600" algn="l" defTabSz="914400" rtl="0" eaLnBrk="1" latinLnBrk="0" hangingPunct="1">
+              <a:lnSpc>
+                <a:spcPct val="90000"/>
+              </a:lnSpc>
+              <a:spcBef>
+                <a:spcPts val="500"/>
+              </a:spcBef>
+              <a:buFont typeface="Arial" panose="020B0604020202020204" pitchFamily="34" charset="0"/>
+              <a:buChar char="•"/>
+              <a:defRPr sz="1800" kern="1200">
+                <a:solidFill>
+                  <a:schemeClr val="tx1"/>
+                </a:solidFill>
+                <a:latin typeface="+mn-lt"/>
+                <a:ea typeface="+mn-ea"/>
+                <a:cs typeface="+mn-cs"/>
+              </a:defRPr>
+            </a:lvl8pPr>
+            <a:lvl9pPr marL="3886200" indent="-228600" algn="l" defTabSz="914400" rtl="0" eaLnBrk="1" latinLnBrk="0" hangingPunct="1">
+              <a:lnSpc>
+                <a:spcPct val="90000"/>
+              </a:lnSpc>
+              <a:spcBef>
+                <a:spcPts val="500"/>
+              </a:spcBef>
+              <a:buFont typeface="Arial" panose="020B0604020202020204" pitchFamily="34" charset="0"/>
+              <a:buChar char="•"/>
+              <a:defRPr sz="1800" kern="1200">
+                <a:solidFill>
+                  <a:schemeClr val="tx1"/>
+                </a:solidFill>
+                <a:latin typeface="+mn-lt"/>
+                <a:ea typeface="+mn-ea"/>
+                <a:cs typeface="+mn-cs"/>
+              </a:defRPr>
+            </a:lvl9pPr>
+          </a:lstStyle>
+          <a:p>
+            <a:pPr marL="0" indent="0" algn="ctr">
+              <a:buNone/>
+            </a:pPr>
+            <a:r>
+              <a:rPr lang="pt-BR" sz="1800" dirty="0" smtClean="0"/>
+              <a:t>... (demais parâmetros do XGBOD)</a:t>
+            </a:r>
+          </a:p>
+          <a:p>
+            <a:pPr marL="0" indent="0" algn="ctr">
+              <a:buNone/>
+            </a:pPr>
+            <a:r>
+              <a:rPr lang="pt-BR" sz="1800" dirty="0" smtClean="0"/>
+              <a:t>Obviamente, X (matriz de observações x </a:t>
+            </a:r>
+            <a:r>
+              <a:rPr lang="pt-BR" sz="1800" dirty="0" err="1" smtClean="0"/>
+              <a:t>features</a:t>
+            </a:r>
+            <a:r>
+              <a:rPr lang="pt-BR" sz="1800" dirty="0" smtClean="0"/>
+              <a:t>) e Y (</a:t>
+            </a:r>
+            <a:r>
+              <a:rPr lang="pt-BR" sz="1800" dirty="0" err="1" smtClean="0"/>
+              <a:t>ground</a:t>
+            </a:r>
+            <a:r>
+              <a:rPr lang="pt-BR" sz="1800" dirty="0" smtClean="0"/>
+              <a:t> </a:t>
+            </a:r>
+            <a:r>
+              <a:rPr lang="pt-BR" sz="1800" dirty="0" err="1" smtClean="0"/>
+              <a:t>truth</a:t>
+            </a:r>
+            <a:r>
+              <a:rPr lang="pt-BR" sz="1800" dirty="0" smtClean="0"/>
+              <a:t> </a:t>
+            </a:r>
+            <a:r>
+              <a:rPr lang="pt-BR" sz="1800" dirty="0" err="1" smtClean="0"/>
+              <a:t>label</a:t>
+            </a:r>
+            <a:r>
+              <a:rPr lang="pt-BR" sz="1800" dirty="0" smtClean="0"/>
+              <a:t>)</a:t>
+            </a:r>
+            <a:endParaRPr lang="pt-BR" sz="1800" dirty="0"/>
+          </a:p>
+        </p:txBody>
+      </p:sp>
+    </p:spTree>
+    <p:extLst>
+      <p:ext uri="{BB962C8B-B14F-4D97-AF65-F5344CB8AC3E}">
+        <p14:creationId xmlns:p14="http://schemas.microsoft.com/office/powerpoint/2010/main" val="3002358105"/>
+      </p:ext>
+    </p:extLst>
+  </p:cSld>
+  <p:clrMapOvr>
+    <a:masterClrMapping/>
+  </p:clrMapOvr>
+</p:sld>
+</file>
+
+<file path=ppt/slides/slide25.xml><?xml version="1.0" encoding="utf-8"?>
+<p:sld xmlns:a="http://schemas.openxmlformats.org/drawingml/2006/main" xmlns:r="http://schemas.openxmlformats.org/officeDocument/2006/relationships" xmlns:p="http://schemas.openxmlformats.org/presentationml/2006/main">
+  <p:cSld>
+    <p:spTree>
+      <p:nvGrpSpPr>
+        <p:cNvPr id="1" name=""/>
+        <p:cNvGrpSpPr/>
+        <p:nvPr/>
+      </p:nvGrpSpPr>
+      <p:grpSpPr>
+        <a:xfrm>
+          <a:off x="0" y="0"/>
+          <a:ext cx="0" cy="0"/>
+          <a:chOff x="0" y="0"/>
+          <a:chExt cx="0" cy="0"/>
+        </a:xfrm>
+      </p:grpSpPr>
+      <p:sp>
+        <p:nvSpPr>
+          <p:cNvPr id="3" name="Espaço Reservado para Número de Slide 2"/>
+          <p:cNvSpPr>
+            <a:spLocks noGrp="1"/>
+          </p:cNvSpPr>
+          <p:nvPr>
+            <p:ph type="sldNum" sz="quarter" idx="12"/>
+          </p:nvPr>
+        </p:nvSpPr>
+        <p:spPr/>
+        <p:txBody>
+          <a:bodyPr/>
+          <a:lstStyle/>
+          <a:p>
+            <a:fld id="{60345120-F3F8-44AB-A502-72CB2236A7D5}" type="slidenum">
+              <a:rPr lang="pt-BR" smtClean="0"/>
+              <a:t>25</a:t>
+            </a:fld>
+            <a:endParaRPr lang="pt-BR"/>
+          </a:p>
+        </p:txBody>
+      </p:sp>
+      <p:sp>
+        <p:nvSpPr>
+          <p:cNvPr id="4" name="Título 3"/>
+          <p:cNvSpPr>
+            <a:spLocks noGrp="1"/>
+          </p:cNvSpPr>
+          <p:nvPr>
+            <p:ph type="title"/>
+          </p:nvPr>
+        </p:nvSpPr>
+        <p:spPr/>
+        <p:txBody>
+          <a:bodyPr/>
+          <a:lstStyle/>
+          <a:p>
+            <a:r>
+              <a:rPr lang="pt-BR" dirty="0" smtClean="0"/>
+              <a:t>Implementação </a:t>
+            </a:r>
+            <a:r>
+              <a:rPr lang="pt-BR" dirty="0" err="1" smtClean="0"/>
+              <a:t>PyOD</a:t>
+            </a:r>
+            <a:r>
+              <a:rPr lang="pt-BR" dirty="0" smtClean="0"/>
+              <a:t>: TOS default</a:t>
+            </a:r>
+            <a:endParaRPr lang="pt-BR" dirty="0"/>
+          </a:p>
+        </p:txBody>
+      </p:sp>
+      <p:grpSp>
+        <p:nvGrpSpPr>
+          <p:cNvPr id="9" name="Grupo 8"/>
+          <p:cNvGrpSpPr/>
+          <p:nvPr/>
+        </p:nvGrpSpPr>
+        <p:grpSpPr>
+          <a:xfrm>
+            <a:off x="0" y="1641229"/>
+            <a:ext cx="12202841" cy="4255477"/>
+            <a:chOff x="838200" y="2070588"/>
+            <a:chExt cx="10839450" cy="3771900"/>
+          </a:xfrm>
+        </p:grpSpPr>
+        <p:pic>
+          <p:nvPicPr>
+            <p:cNvPr id="6" name="Imagem 5"/>
+            <p:cNvPicPr>
+              <a:picLocks noChangeAspect="1"/>
+            </p:cNvPicPr>
+            <p:nvPr/>
+          </p:nvPicPr>
+          <p:blipFill>
+            <a:blip r:embed="rId2"/>
+            <a:stretch>
+              <a:fillRect/>
+            </a:stretch>
+          </p:blipFill>
+          <p:spPr>
+            <a:xfrm>
+              <a:off x="838200" y="2070588"/>
+              <a:ext cx="5410200" cy="3771900"/>
+            </a:xfrm>
+            <a:prstGeom prst="rect">
+              <a:avLst/>
+            </a:prstGeom>
+          </p:spPr>
+        </p:pic>
+        <p:pic>
+          <p:nvPicPr>
+            <p:cNvPr id="7" name="Imagem 6"/>
+            <p:cNvPicPr>
+              <a:picLocks noChangeAspect="1"/>
+            </p:cNvPicPr>
+            <p:nvPr/>
+          </p:nvPicPr>
+          <p:blipFill>
+            <a:blip r:embed="rId3"/>
+            <a:stretch>
+              <a:fillRect/>
+            </a:stretch>
+          </p:blipFill>
+          <p:spPr>
+            <a:xfrm>
+              <a:off x="6248400" y="2070588"/>
+              <a:ext cx="5429250" cy="3657600"/>
+            </a:xfrm>
+            <a:prstGeom prst="rect">
+              <a:avLst/>
+            </a:prstGeom>
+          </p:spPr>
+        </p:pic>
+        <p:sp>
+          <p:nvSpPr>
+            <p:cNvPr id="8" name="Retângulo 7"/>
+            <p:cNvSpPr/>
+            <p:nvPr/>
+          </p:nvSpPr>
+          <p:spPr>
+            <a:xfrm>
+              <a:off x="6248400" y="5627077"/>
+              <a:ext cx="5429250" cy="215411"/>
+            </a:xfrm>
+            <a:prstGeom prst="rect">
+              <a:avLst/>
+            </a:prstGeom>
+            <a:solidFill>
+              <a:srgbClr val="282C34"/>
+            </a:solidFill>
+            <a:ln>
+              <a:noFill/>
+            </a:ln>
+          </p:spPr>
+          <p:style>
+            <a:lnRef idx="2">
+              <a:schemeClr val="accent1">
+                <a:shade val="50000"/>
+              </a:schemeClr>
+            </a:lnRef>
+            <a:fillRef idx="1">
+              <a:schemeClr val="accent1"/>
+            </a:fillRef>
+            <a:effectRef idx="0">
+              <a:schemeClr val="accent1"/>
+            </a:effectRef>
+            <a:fontRef idx="minor">
+              <a:schemeClr val="lt1"/>
+            </a:fontRef>
+          </p:style>
+          <p:txBody>
+            <a:bodyPr rtlCol="0" anchor="ctr"/>
+            <a:lstStyle/>
+            <a:p>
+              <a:pPr algn="ctr"/>
+              <a:endParaRPr lang="pt-BR"/>
+            </a:p>
+          </p:txBody>
+        </p:sp>
+      </p:grpSp>
+      <p:sp>
+        <p:nvSpPr>
+          <p:cNvPr id="10" name="Espaço Reservado para Conteúdo 1"/>
+          <p:cNvSpPr>
+            <a:spLocks noGrp="1"/>
+          </p:cNvSpPr>
+          <p:nvPr>
+            <p:ph idx="1"/>
+          </p:nvPr>
+        </p:nvSpPr>
+        <p:spPr>
+          <a:xfrm>
+            <a:off x="838200" y="6059362"/>
+            <a:ext cx="10515600" cy="468924"/>
+          </a:xfrm>
+        </p:spPr>
+        <p:txBody>
+          <a:bodyPr>
+            <a:normAutofit/>
+          </a:bodyPr>
+          <a:lstStyle/>
+          <a:p>
+            <a:pPr marL="0" indent="0" algn="ctr">
+              <a:buNone/>
+            </a:pPr>
+            <a:r>
+              <a:rPr lang="pt-BR" sz="2400" dirty="0" smtClean="0"/>
+              <a:t>Inicializa 68 algoritmos não supervisionados por default</a:t>
+            </a:r>
+            <a:endParaRPr lang="pt-BR" sz="2400" dirty="0"/>
+          </a:p>
+        </p:txBody>
+      </p:sp>
+    </p:spTree>
+    <p:extLst>
+      <p:ext uri="{BB962C8B-B14F-4D97-AF65-F5344CB8AC3E}">
+        <p14:creationId xmlns:p14="http://schemas.microsoft.com/office/powerpoint/2010/main" val="329100283"/>
+      </p:ext>
+    </p:extLst>
+  </p:cSld>
+  <p:clrMapOvr>
+    <a:masterClrMapping/>
+  </p:clrMapOvr>
+  <p:timing>
+    <p:tnLst>
+      <p:par>
+        <p:cTn id="1" dur="indefinite" restart="never" nodeType="tmRoot"/>
+      </p:par>
+    </p:tnLst>
+  </p:timing>
+</p:sld>
+</file>
+
+<file path=ppt/slides/slide26.xml><?xml version="1.0" encoding="utf-8"?>
+<p:sld xmlns:a="http://schemas.openxmlformats.org/drawingml/2006/main" xmlns:r="http://schemas.openxmlformats.org/officeDocument/2006/relationships" xmlns:p="http://schemas.openxmlformats.org/presentationml/2006/main">
+  <p:cSld>
+    <p:spTree>
+      <p:nvGrpSpPr>
+        <p:cNvPr id="1" name=""/>
+        <p:cNvGrpSpPr/>
+        <p:nvPr/>
+      </p:nvGrpSpPr>
+      <p:grpSpPr>
+        <a:xfrm>
+          <a:off x="0" y="0"/>
+          <a:ext cx="0" cy="0"/>
+          <a:chOff x="0" y="0"/>
+          <a:chExt cx="0" cy="0"/>
+        </a:xfrm>
+      </p:grpSpPr>
+      <p:sp>
+        <p:nvSpPr>
+          <p:cNvPr id="3" name="Espaço Reservado para Número de Slide 2"/>
+          <p:cNvSpPr>
+            <a:spLocks noGrp="1"/>
+          </p:cNvSpPr>
+          <p:nvPr>
+            <p:ph type="sldNum" sz="quarter" idx="12"/>
+          </p:nvPr>
+        </p:nvSpPr>
+        <p:spPr>
+          <a:xfrm>
+            <a:off x="8610600" y="6493224"/>
+            <a:ext cx="2743200" cy="365125"/>
+          </a:xfrm>
+        </p:spPr>
+        <p:txBody>
+          <a:bodyPr/>
+          <a:lstStyle/>
+          <a:p>
+            <a:fld id="{60345120-F3F8-44AB-A502-72CB2236A7D5}" type="slidenum">
+              <a:rPr lang="pt-BR" smtClean="0"/>
+              <a:t>26</a:t>
+            </a:fld>
+            <a:endParaRPr lang="pt-BR"/>
+          </a:p>
+        </p:txBody>
+      </p:sp>
+      <p:sp>
+        <p:nvSpPr>
+          <p:cNvPr id="4" name="Título 3"/>
+          <p:cNvSpPr>
+            <a:spLocks noGrp="1"/>
+          </p:cNvSpPr>
+          <p:nvPr>
+            <p:ph type="title"/>
+          </p:nvPr>
+        </p:nvSpPr>
+        <p:spPr/>
+        <p:txBody>
+          <a:bodyPr/>
+          <a:lstStyle/>
+          <a:p>
+            <a:r>
+              <a:rPr lang="pt-BR" dirty="0" smtClean="0"/>
+              <a:t>Implementação </a:t>
+            </a:r>
+            <a:r>
+              <a:rPr lang="pt-BR" dirty="0" err="1" smtClean="0"/>
+              <a:t>PyOD</a:t>
+            </a:r>
+            <a:r>
+              <a:rPr lang="pt-BR" dirty="0" smtClean="0"/>
+              <a:t>: </a:t>
+            </a:r>
+            <a:r>
+              <a:rPr lang="pt-BR" dirty="0" err="1" smtClean="0"/>
+              <a:t>fitting</a:t>
+            </a:r>
+            <a:r>
+              <a:rPr lang="pt-BR" dirty="0" smtClean="0"/>
+              <a:t> </a:t>
+            </a:r>
+            <a:r>
+              <a:rPr lang="pt-BR" dirty="0" err="1" smtClean="0"/>
+              <a:t>function</a:t>
+            </a:r>
+            <a:endParaRPr lang="pt-BR" dirty="0"/>
+          </a:p>
+        </p:txBody>
+      </p:sp>
+      <p:grpSp>
+        <p:nvGrpSpPr>
+          <p:cNvPr id="9" name="Grupo 8"/>
+          <p:cNvGrpSpPr/>
+          <p:nvPr/>
+        </p:nvGrpSpPr>
+        <p:grpSpPr>
+          <a:xfrm>
+            <a:off x="0" y="1552573"/>
+            <a:ext cx="12203196" cy="4940651"/>
+            <a:chOff x="316889" y="1902435"/>
+            <a:chExt cx="10963275" cy="4438650"/>
+          </a:xfrm>
+        </p:grpSpPr>
+        <p:pic>
+          <p:nvPicPr>
+            <p:cNvPr id="6" name="Imagem 5"/>
+            <p:cNvPicPr>
+              <a:picLocks noChangeAspect="1"/>
+            </p:cNvPicPr>
+            <p:nvPr/>
+          </p:nvPicPr>
+          <p:blipFill>
+            <a:blip r:embed="rId2"/>
+            <a:stretch>
+              <a:fillRect/>
+            </a:stretch>
+          </p:blipFill>
+          <p:spPr>
+            <a:xfrm>
+              <a:off x="316889" y="1902435"/>
+              <a:ext cx="5438775" cy="3076575"/>
+            </a:xfrm>
+            <a:prstGeom prst="rect">
+              <a:avLst/>
+            </a:prstGeom>
+          </p:spPr>
+        </p:pic>
+        <p:pic>
+          <p:nvPicPr>
+            <p:cNvPr id="7" name="Imagem 6"/>
+            <p:cNvPicPr>
+              <a:picLocks noChangeAspect="1"/>
+            </p:cNvPicPr>
+            <p:nvPr/>
+          </p:nvPicPr>
+          <p:blipFill>
+            <a:blip r:embed="rId3"/>
+            <a:stretch>
+              <a:fillRect/>
+            </a:stretch>
+          </p:blipFill>
+          <p:spPr>
+            <a:xfrm>
+              <a:off x="5755664" y="1902435"/>
+              <a:ext cx="5524500" cy="4438650"/>
+            </a:xfrm>
+            <a:prstGeom prst="rect">
+              <a:avLst/>
+            </a:prstGeom>
+          </p:spPr>
+        </p:pic>
+        <p:sp>
+          <p:nvSpPr>
+            <p:cNvPr id="8" name="Retângulo 7"/>
+            <p:cNvSpPr/>
+            <p:nvPr/>
+          </p:nvSpPr>
+          <p:spPr>
+            <a:xfrm>
+              <a:off x="316889" y="4979009"/>
+              <a:ext cx="5438775" cy="1362075"/>
+            </a:xfrm>
+            <a:prstGeom prst="rect">
+              <a:avLst/>
+            </a:prstGeom>
+            <a:solidFill>
+              <a:srgbClr val="282C34"/>
+            </a:solidFill>
+            <a:ln>
+              <a:noFill/>
+            </a:ln>
+          </p:spPr>
+          <p:style>
+            <a:lnRef idx="2">
+              <a:schemeClr val="accent1">
+                <a:shade val="50000"/>
+              </a:schemeClr>
+            </a:lnRef>
+            <a:fillRef idx="1">
+              <a:schemeClr val="accent1"/>
+            </a:fillRef>
+            <a:effectRef idx="0">
+              <a:schemeClr val="accent1"/>
+            </a:effectRef>
+            <a:fontRef idx="minor">
+              <a:schemeClr val="lt1"/>
+            </a:fontRef>
+          </p:style>
+          <p:txBody>
+            <a:bodyPr rtlCol="0" anchor="ctr"/>
+            <a:lstStyle/>
+            <a:p>
+              <a:pPr algn="ctr"/>
+              <a:endParaRPr lang="pt-BR"/>
+            </a:p>
+          </p:txBody>
+        </p:sp>
+      </p:grpSp>
+    </p:spTree>
+    <p:extLst>
+      <p:ext uri="{BB962C8B-B14F-4D97-AF65-F5344CB8AC3E}">
+        <p14:creationId xmlns:p14="http://schemas.microsoft.com/office/powerpoint/2010/main" val="1130186745"/>
+      </p:ext>
+    </p:extLst>
+  </p:cSld>
+  <p:clrMapOvr>
+    <a:masterClrMapping/>
+  </p:clrMapOvr>
+</p:sld>
+</file>
+
+<file path=ppt/slides/slide27.xml><?xml version="1.0" encoding="utf-8"?>
+<p:sld xmlns:a="http://schemas.openxmlformats.org/drawingml/2006/main" xmlns:r="http://schemas.openxmlformats.org/officeDocument/2006/relationships" xmlns:p="http://schemas.openxmlformats.org/presentationml/2006/main">
+  <p:cSld>
+    <p:spTree>
+      <p:nvGrpSpPr>
+        <p:cNvPr id="1" name=""/>
+        <p:cNvGrpSpPr/>
+        <p:nvPr/>
+      </p:nvGrpSpPr>
+      <p:grpSpPr>
+        <a:xfrm>
+          <a:off x="0" y="0"/>
+          <a:ext cx="0" cy="0"/>
+          <a:chOff x="0" y="0"/>
+          <a:chExt cx="0" cy="0"/>
+        </a:xfrm>
+      </p:grpSpPr>
+      <p:sp>
+        <p:nvSpPr>
+          <p:cNvPr id="3" name="Espaço Reservado para Número de Slide 2"/>
+          <p:cNvSpPr>
+            <a:spLocks noGrp="1"/>
+          </p:cNvSpPr>
+          <p:nvPr>
+            <p:ph type="sldNum" sz="quarter" idx="12"/>
+          </p:nvPr>
+        </p:nvSpPr>
+        <p:spPr/>
+        <p:txBody>
+          <a:bodyPr/>
+          <a:lstStyle/>
+          <a:p>
+            <a:fld id="{60345120-F3F8-44AB-A502-72CB2236A7D5}" type="slidenum">
+              <a:rPr lang="pt-BR" smtClean="0"/>
+              <a:t>27</a:t>
+            </a:fld>
+            <a:endParaRPr lang="pt-BR"/>
+          </a:p>
+        </p:txBody>
+      </p:sp>
+      <p:sp>
+        <p:nvSpPr>
+          <p:cNvPr id="4" name="Título 3"/>
+          <p:cNvSpPr>
+            <a:spLocks noGrp="1"/>
+          </p:cNvSpPr>
+          <p:nvPr>
+            <p:ph type="title"/>
+          </p:nvPr>
+        </p:nvSpPr>
+        <p:spPr/>
+        <p:txBody>
+          <a:bodyPr/>
+          <a:lstStyle/>
+          <a:p>
+            <a:r>
+              <a:rPr lang="pt-BR" dirty="0" smtClean="0"/>
+              <a:t>Implementação </a:t>
+            </a:r>
+            <a:r>
+              <a:rPr lang="pt-BR" dirty="0" err="1" smtClean="0"/>
+              <a:t>PyOD</a:t>
+            </a:r>
+            <a:r>
+              <a:rPr lang="pt-BR" dirty="0" smtClean="0"/>
+              <a:t>: </a:t>
+            </a:r>
+            <a:r>
+              <a:rPr lang="pt-BR" dirty="0" err="1" smtClean="0"/>
+              <a:t>Predicting</a:t>
+            </a:r>
+            <a:r>
+              <a:rPr lang="pt-BR" dirty="0" smtClean="0"/>
+              <a:t> </a:t>
+            </a:r>
+            <a:r>
+              <a:rPr lang="pt-BR" dirty="0" err="1" smtClean="0"/>
+              <a:t>function</a:t>
+            </a:r>
+            <a:endParaRPr lang="pt-BR" dirty="0"/>
+          </a:p>
+        </p:txBody>
+      </p:sp>
+      <p:grpSp>
+        <p:nvGrpSpPr>
+          <p:cNvPr id="9" name="Grupo 8"/>
+          <p:cNvGrpSpPr/>
+          <p:nvPr/>
+        </p:nvGrpSpPr>
+        <p:grpSpPr>
+          <a:xfrm>
+            <a:off x="2927104" y="1993656"/>
+            <a:ext cx="6310679" cy="3975161"/>
+            <a:chOff x="3267075" y="2028825"/>
+            <a:chExt cx="5657850" cy="3563937"/>
+          </a:xfrm>
+        </p:grpSpPr>
+        <p:pic>
+          <p:nvPicPr>
+            <p:cNvPr id="5" name="Imagem 4"/>
+            <p:cNvPicPr>
+              <a:picLocks noChangeAspect="1"/>
+            </p:cNvPicPr>
+            <p:nvPr/>
+          </p:nvPicPr>
+          <p:blipFill>
+            <a:blip r:embed="rId2"/>
+            <a:stretch>
+              <a:fillRect/>
+            </a:stretch>
+          </p:blipFill>
+          <p:spPr>
+            <a:xfrm>
+              <a:off x="3267075" y="2028825"/>
+              <a:ext cx="5657850" cy="2800350"/>
+            </a:xfrm>
+            <a:prstGeom prst="rect">
+              <a:avLst/>
+            </a:prstGeom>
+          </p:spPr>
+        </p:pic>
+        <p:pic>
+          <p:nvPicPr>
+            <p:cNvPr id="7" name="Imagem 6"/>
+            <p:cNvPicPr>
+              <a:picLocks noChangeAspect="1"/>
+            </p:cNvPicPr>
+            <p:nvPr/>
+          </p:nvPicPr>
+          <p:blipFill>
+            <a:blip r:embed="rId3"/>
+            <a:stretch>
+              <a:fillRect/>
+            </a:stretch>
+          </p:blipFill>
+          <p:spPr>
+            <a:xfrm>
+              <a:off x="3267075" y="4973637"/>
+              <a:ext cx="4714875" cy="619125"/>
+            </a:xfrm>
+            <a:prstGeom prst="rect">
+              <a:avLst/>
+            </a:prstGeom>
+          </p:spPr>
+        </p:pic>
+        <p:sp>
+          <p:nvSpPr>
+            <p:cNvPr id="8" name="Retângulo 7"/>
+            <p:cNvSpPr/>
+            <p:nvPr/>
+          </p:nvSpPr>
+          <p:spPr>
+            <a:xfrm>
+              <a:off x="7981950" y="4973636"/>
+              <a:ext cx="942975" cy="614363"/>
+            </a:xfrm>
+            <a:prstGeom prst="rect">
+              <a:avLst/>
+            </a:prstGeom>
+            <a:solidFill>
+              <a:srgbClr val="282C34"/>
+            </a:solidFill>
+            <a:ln>
+              <a:noFill/>
+            </a:ln>
+          </p:spPr>
+          <p:style>
+            <a:lnRef idx="2">
+              <a:schemeClr val="accent1">
+                <a:shade val="50000"/>
+              </a:schemeClr>
+            </a:lnRef>
+            <a:fillRef idx="1">
+              <a:schemeClr val="accent1"/>
+            </a:fillRef>
+            <a:effectRef idx="0">
+              <a:schemeClr val="accent1"/>
+            </a:effectRef>
+            <a:fontRef idx="minor">
+              <a:schemeClr val="lt1"/>
+            </a:fontRef>
+          </p:style>
+          <p:txBody>
+            <a:bodyPr rtlCol="0" anchor="ctr"/>
+            <a:lstStyle/>
+            <a:p>
+              <a:pPr algn="ctr"/>
+              <a:endParaRPr lang="pt-BR"/>
+            </a:p>
+          </p:txBody>
+        </p:sp>
+      </p:grpSp>
+    </p:spTree>
+    <p:extLst>
+      <p:ext uri="{BB962C8B-B14F-4D97-AF65-F5344CB8AC3E}">
+        <p14:creationId xmlns:p14="http://schemas.microsoft.com/office/powerpoint/2010/main" val="3594336399"/>
+      </p:ext>
+    </p:extLst>
+  </p:cSld>
+  <p:clrMapOvr>
+    <a:masterClrMapping/>
+  </p:clrMapOvr>
+</p:sld>
+</file>
+
+<file path=ppt/slides/slide28.xml><?xml version="1.0" encoding="utf-8"?>
+<p:sld xmlns:a="http://schemas.openxmlformats.org/drawingml/2006/main" xmlns:r="http://schemas.openxmlformats.org/officeDocument/2006/relationships" xmlns:p="http://schemas.openxmlformats.org/presentationml/2006/main">
+  <p:cSld>
+    <p:spTree>
+      <p:nvGrpSpPr>
+        <p:cNvPr id="1" name=""/>
+        <p:cNvGrpSpPr/>
+        <p:nvPr/>
+      </p:nvGrpSpPr>
+      <p:grpSpPr>
+        <a:xfrm>
+          <a:off x="0" y="0"/>
+          <a:ext cx="0" cy="0"/>
+          <a:chOff x="0" y="0"/>
+          <a:chExt cx="0" cy="0"/>
+        </a:xfrm>
+      </p:grpSpPr>
+      <p:sp>
+        <p:nvSpPr>
+          <p:cNvPr id="2" name="Espaço Reservado para Conteúdo 1"/>
+          <p:cNvSpPr>
+            <a:spLocks noGrp="1"/>
+          </p:cNvSpPr>
+          <p:nvPr>
+            <p:ph idx="1"/>
+          </p:nvPr>
+        </p:nvSpPr>
+        <p:spPr>
+          <a:xfrm>
+            <a:off x="838200" y="2297723"/>
+            <a:ext cx="10515600" cy="3879240"/>
+          </a:xfrm>
+        </p:spPr>
+        <p:txBody>
+          <a:bodyPr>
+            <a:normAutofit/>
+          </a:bodyPr>
+          <a:lstStyle/>
+          <a:p>
+            <a:r>
+              <a:rPr lang="pt-BR" sz="3200" dirty="0" smtClean="0"/>
+              <a:t>Algoritmo incompleto (biblioteca no beta)</a:t>
+            </a:r>
+          </a:p>
+          <a:p>
+            <a:pPr lvl="1"/>
+            <a:r>
+              <a:rPr lang="pt-BR" sz="2800" dirty="0" smtClean="0"/>
+              <a:t>Não implementa nenhum TOS </a:t>
+            </a:r>
+            <a:r>
+              <a:rPr lang="pt-BR" sz="2800" dirty="0" err="1" smtClean="0"/>
+              <a:t>selection</a:t>
+            </a:r>
+            <a:r>
+              <a:rPr lang="pt-BR" sz="2800" dirty="0" smtClean="0"/>
+              <a:t> (utiliza todas os K TOS, não R)</a:t>
+            </a:r>
+          </a:p>
+          <a:p>
+            <a:pPr lvl="1"/>
+            <a:endParaRPr lang="pt-BR" sz="3200" dirty="0"/>
+          </a:p>
+          <a:p>
+            <a:r>
+              <a:rPr lang="pt-BR" sz="3200" dirty="0" smtClean="0"/>
+              <a:t>Modo verboso -&gt; debug e tempo de execução</a:t>
+            </a:r>
+          </a:p>
+          <a:p>
+            <a:pPr lvl="1"/>
+            <a:r>
+              <a:rPr lang="pt-BR" sz="2800" dirty="0" smtClean="0"/>
+              <a:t>Alto tempo de execução (importante acompanhar o processo)</a:t>
+            </a:r>
+          </a:p>
+        </p:txBody>
+      </p:sp>
+      <p:sp>
+        <p:nvSpPr>
+          <p:cNvPr id="3" name="Espaço Reservado para Número de Slide 2"/>
+          <p:cNvSpPr>
+            <a:spLocks noGrp="1"/>
+          </p:cNvSpPr>
+          <p:nvPr>
+            <p:ph type="sldNum" sz="quarter" idx="12"/>
+          </p:nvPr>
+        </p:nvSpPr>
+        <p:spPr/>
+        <p:txBody>
+          <a:bodyPr/>
+          <a:lstStyle/>
+          <a:p>
+            <a:fld id="{60345120-F3F8-44AB-A502-72CB2236A7D5}" type="slidenum">
+              <a:rPr lang="pt-BR" smtClean="0"/>
+              <a:t>28</a:t>
+            </a:fld>
+            <a:endParaRPr lang="pt-BR"/>
+          </a:p>
+        </p:txBody>
+      </p:sp>
+      <p:sp>
+        <p:nvSpPr>
+          <p:cNvPr id="4" name="Título 3"/>
+          <p:cNvSpPr>
+            <a:spLocks noGrp="1"/>
+          </p:cNvSpPr>
+          <p:nvPr>
+            <p:ph type="title"/>
+          </p:nvPr>
+        </p:nvSpPr>
+        <p:spPr/>
+        <p:txBody>
+          <a:bodyPr/>
+          <a:lstStyle/>
+          <a:p>
+            <a:r>
+              <a:rPr lang="pt-BR" dirty="0" smtClean="0"/>
+              <a:t>Sugestões do grupo</a:t>
+            </a:r>
+            <a:endParaRPr lang="pt-BR" dirty="0"/>
+          </a:p>
+        </p:txBody>
+      </p:sp>
+    </p:spTree>
+    <p:extLst>
+      <p:ext uri="{BB962C8B-B14F-4D97-AF65-F5344CB8AC3E}">
+        <p14:creationId xmlns:p14="http://schemas.microsoft.com/office/powerpoint/2010/main" val="4044584337"/>
+      </p:ext>
+    </p:extLst>
+  </p:cSld>
+  <p:clrMapOvr>
+    <a:masterClrMapping/>
+  </p:clrMapOvr>
+  <p:timing>
+    <p:tnLst>
+      <p:par>
+        <p:cTn id="1" dur="indefinite" restart="never" nodeType="tmRoot"/>
+      </p:par>
+    </p:tnLst>
+  </p:timing>
+</p:sld>
+</file>
+
+<file path=ppt/slides/slide29.xml><?xml version="1.0" encoding="utf-8"?>
+<p:sld xmlns:a="http://schemas.openxmlformats.org/drawingml/2006/main" xmlns:r="http://schemas.openxmlformats.org/officeDocument/2006/relationships" xmlns:p="http://schemas.openxmlformats.org/presentationml/2006/main">
+  <p:cSld>
+    <p:spTree>
+      <p:nvGrpSpPr>
+        <p:cNvPr id="1" name=""/>
+        <p:cNvGrpSpPr/>
+        <p:nvPr/>
+      </p:nvGrpSpPr>
+      <p:grpSpPr>
+        <a:xfrm>
+          <a:off x="0" y="0"/>
+          <a:ext cx="0" cy="0"/>
+          <a:chOff x="0" y="0"/>
+          <a:chExt cx="0" cy="0"/>
+        </a:xfrm>
+      </p:grpSpPr>
+      <p:sp>
+        <p:nvSpPr>
+          <p:cNvPr id="2" name="Espaço Reservado para Conteúdo 1"/>
+          <p:cNvSpPr>
+            <a:spLocks noGrp="1"/>
+          </p:cNvSpPr>
+          <p:nvPr>
+            <p:ph idx="1"/>
+          </p:nvPr>
+        </p:nvSpPr>
+        <p:spPr/>
+        <p:txBody>
+          <a:bodyPr/>
+          <a:lstStyle/>
+          <a:p>
+            <a:endParaRPr lang="pt-BR" dirty="0" smtClean="0"/>
+          </a:p>
+        </p:txBody>
+      </p:sp>
+      <p:sp>
+        <p:nvSpPr>
+          <p:cNvPr id="3" name="Espaço Reservado para Número de Slide 2"/>
+          <p:cNvSpPr>
+            <a:spLocks noGrp="1"/>
+          </p:cNvSpPr>
+          <p:nvPr>
+            <p:ph type="sldNum" sz="quarter" idx="12"/>
+          </p:nvPr>
+        </p:nvSpPr>
+        <p:spPr/>
+        <p:txBody>
+          <a:bodyPr/>
+          <a:lstStyle/>
+          <a:p>
+            <a:fld id="{60345120-F3F8-44AB-A502-72CB2236A7D5}" type="slidenum">
+              <a:rPr lang="pt-BR" smtClean="0"/>
+              <a:t>29</a:t>
+            </a:fld>
+            <a:endParaRPr lang="pt-BR"/>
+          </a:p>
+        </p:txBody>
+      </p:sp>
+      <p:sp>
+        <p:nvSpPr>
+          <p:cNvPr id="4" name="Título 3"/>
+          <p:cNvSpPr>
+            <a:spLocks noGrp="1"/>
+          </p:cNvSpPr>
+          <p:nvPr>
+            <p:ph type="title"/>
+          </p:nvPr>
+        </p:nvSpPr>
+        <p:spPr/>
+        <p:txBody>
+          <a:bodyPr/>
+          <a:lstStyle/>
+          <a:p>
+            <a:endParaRPr lang="pt-BR"/>
+          </a:p>
+        </p:txBody>
+      </p:sp>
+    </p:spTree>
+    <p:extLst>
+      <p:ext uri="{BB962C8B-B14F-4D97-AF65-F5344CB8AC3E}">
+        <p14:creationId xmlns:p14="http://schemas.microsoft.com/office/powerpoint/2010/main" val="3080274979"/>
+      </p:ext>
+    </p:extLst>
+  </p:cSld>
+  <p:clrMapOvr>
+    <a:masterClrMapping/>
+  </p:clrMapOvr>
+</p:sld>
+</file>
+
+<file path=ppt/slides/slide3.xml><?xml version="1.0" encoding="utf-8"?>
+<p:sld xmlns:a="http://schemas.openxmlformats.org/drawingml/2006/main" xmlns:r="http://schemas.openxmlformats.org/officeDocument/2006/relationships" xmlns:p="http://schemas.openxmlformats.org/presentationml/2006/main">
+  <p:cSld>
+    <p:spTree>
+      <p:nvGrpSpPr>
+        <p:cNvPr id="1" name=""/>
+        <p:cNvGrpSpPr/>
+        <p:nvPr/>
+      </p:nvGrpSpPr>
+      <p:grpSpPr>
+        <a:xfrm>
+          <a:off x="0" y="0"/>
+          <a:ext cx="0" cy="0"/>
+          <a:chOff x="0" y="0"/>
+          <a:chExt cx="0" cy="0"/>
+        </a:xfrm>
+      </p:grpSpPr>
+      <p:sp>
+        <p:nvSpPr>
+          <p:cNvPr id="2" name="Espaço Reservado para Conteúdo 1"/>
+          <p:cNvSpPr>
+            <a:spLocks noGrp="1"/>
+          </p:cNvSpPr>
+          <p:nvPr>
+            <p:ph idx="1"/>
+          </p:nvPr>
+        </p:nvSpPr>
+        <p:spPr>
+          <a:xfrm>
+            <a:off x="838200" y="2180491"/>
+            <a:ext cx="10515600" cy="3996471"/>
+          </a:xfrm>
+        </p:spPr>
+        <p:txBody>
+          <a:bodyPr>
+            <a:normAutofit/>
+          </a:bodyPr>
+          <a:lstStyle/>
+          <a:p>
+            <a:r>
+              <a:rPr lang="pt-BR" sz="3200" dirty="0" smtClean="0"/>
+              <a:t>Extensão do trabalho de </a:t>
+            </a:r>
+            <a:r>
+              <a:rPr lang="pt-BR" sz="3200" dirty="0" err="1" smtClean="0"/>
+              <a:t>Micenková</a:t>
+            </a:r>
+            <a:r>
+              <a:rPr lang="pt-BR" sz="3200" dirty="0" smtClean="0"/>
+              <a:t> et al. (2014, 2015)</a:t>
+            </a:r>
+          </a:p>
+          <a:p>
+            <a:pPr lvl="1"/>
+            <a:r>
+              <a:rPr lang="pt-BR" sz="2800" dirty="0" smtClean="0"/>
+              <a:t>Proposta de framework para </a:t>
+            </a:r>
+            <a:r>
+              <a:rPr lang="pt-BR" sz="2800" dirty="0" err="1" smtClean="0"/>
+              <a:t>outlier</a:t>
+            </a:r>
+            <a:r>
+              <a:rPr lang="pt-BR" sz="2800" dirty="0" smtClean="0"/>
+              <a:t> </a:t>
+            </a:r>
+            <a:r>
+              <a:rPr lang="pt-BR" sz="2800" dirty="0" err="1" smtClean="0"/>
+              <a:t>detection</a:t>
+            </a:r>
+            <a:endParaRPr lang="pt-BR" sz="2800" dirty="0"/>
+          </a:p>
+          <a:p>
+            <a:pPr lvl="1"/>
+            <a:r>
+              <a:rPr lang="pt-BR" sz="2800" dirty="0" smtClean="0"/>
+              <a:t>Scores de diversos algoritmos não supervisionados são utilizados para gerar novas </a:t>
+            </a:r>
+            <a:r>
+              <a:rPr lang="pt-BR" sz="2800" dirty="0" err="1" smtClean="0"/>
+              <a:t>features</a:t>
+            </a:r>
+            <a:r>
+              <a:rPr lang="pt-BR" sz="2800" dirty="0"/>
+              <a:t> </a:t>
+            </a:r>
+            <a:r>
+              <a:rPr lang="pt-BR" sz="2800" dirty="0" smtClean="0"/>
+              <a:t>-&gt; </a:t>
+            </a:r>
+            <a:r>
+              <a:rPr lang="pt-BR" sz="2800" dirty="0" err="1" smtClean="0"/>
+              <a:t>unsupervised</a:t>
+            </a:r>
+            <a:r>
+              <a:rPr lang="pt-BR" sz="2800" dirty="0" smtClean="0"/>
+              <a:t> </a:t>
+            </a:r>
+            <a:r>
+              <a:rPr lang="pt-BR" sz="2800" dirty="0" err="1" smtClean="0"/>
+              <a:t>feature</a:t>
+            </a:r>
+            <a:r>
+              <a:rPr lang="pt-BR" sz="2800" dirty="0" smtClean="0"/>
+              <a:t> </a:t>
+            </a:r>
+            <a:r>
+              <a:rPr lang="pt-BR" sz="2800" dirty="0" err="1" smtClean="0"/>
+              <a:t>engineer</a:t>
+            </a:r>
+            <a:endParaRPr lang="pt-BR" sz="2800" dirty="0" smtClean="0"/>
+          </a:p>
+          <a:p>
+            <a:pPr lvl="1"/>
+            <a:r>
+              <a:rPr lang="pt-BR" sz="2800" dirty="0" smtClean="0"/>
+              <a:t>As novas </a:t>
+            </a:r>
+            <a:r>
+              <a:rPr lang="pt-BR" sz="2800" dirty="0" err="1" smtClean="0"/>
+              <a:t>features</a:t>
+            </a:r>
+            <a:r>
+              <a:rPr lang="pt-BR" sz="2800" dirty="0" smtClean="0"/>
+              <a:t> são agregadas às antigas e enviadas a um classificador supervisionado final</a:t>
+            </a:r>
+            <a:endParaRPr lang="pt-BR" sz="2800" dirty="0"/>
+          </a:p>
+        </p:txBody>
+      </p:sp>
+      <p:sp>
+        <p:nvSpPr>
+          <p:cNvPr id="3" name="Espaço Reservado para Número de Slide 2"/>
+          <p:cNvSpPr>
+            <a:spLocks noGrp="1"/>
+          </p:cNvSpPr>
+          <p:nvPr>
+            <p:ph type="sldNum" sz="quarter" idx="12"/>
+          </p:nvPr>
+        </p:nvSpPr>
+        <p:spPr/>
+        <p:txBody>
+          <a:bodyPr/>
+          <a:lstStyle/>
+          <a:p>
+            <a:fld id="{60345120-F3F8-44AB-A502-72CB2236A7D5}" type="slidenum">
+              <a:rPr lang="pt-BR" smtClean="0"/>
+              <a:t>3</a:t>
+            </a:fld>
+            <a:endParaRPr lang="pt-BR"/>
+          </a:p>
+        </p:txBody>
+      </p:sp>
+      <p:sp>
+        <p:nvSpPr>
+          <p:cNvPr id="4" name="Título 3"/>
+          <p:cNvSpPr>
+            <a:spLocks noGrp="1"/>
+          </p:cNvSpPr>
+          <p:nvPr>
+            <p:ph type="title"/>
+          </p:nvPr>
+        </p:nvSpPr>
+        <p:spPr/>
+        <p:txBody>
+          <a:bodyPr/>
+          <a:lstStyle/>
+          <a:p>
+            <a:r>
+              <a:rPr lang="pt-BR" dirty="0"/>
+              <a:t>Trabalho </a:t>
+            </a:r>
+            <a:r>
+              <a:rPr lang="pt-BR" dirty="0" smtClean="0"/>
+              <a:t>Correlato</a:t>
+            </a:r>
+            <a:endParaRPr lang="pt-BR" dirty="0"/>
+          </a:p>
+        </p:txBody>
+      </p:sp>
+    </p:spTree>
+    <p:extLst>
+      <p:ext uri="{BB962C8B-B14F-4D97-AF65-F5344CB8AC3E}">
+        <p14:creationId xmlns:p14="http://schemas.microsoft.com/office/powerpoint/2010/main" val="1450861679"/>
+      </p:ext>
+    </p:extLst>
+  </p:cSld>
+  <p:clrMapOvr>
+    <a:masterClrMapping/>
+  </p:clrMapOvr>
+  <p:timing>
+    <p:tnLst>
+      <p:par>
+        <p:cTn id="1" dur="indefinite" restart="never" nodeType="tmRoot"/>
+      </p:par>
+    </p:tnLst>
+  </p:timing>
+</p:sld>
+</file>
+
+<file path=ppt/slides/slide30.xml><?xml version="1.0" encoding="utf-8"?>
+<p:sld xmlns:a="http://schemas.openxmlformats.org/drawingml/2006/main" xmlns:r="http://schemas.openxmlformats.org/officeDocument/2006/relationships" xmlns:p="http://schemas.openxmlformats.org/presentationml/2006/main">
+  <p:cSld>
+    <p:spTree>
+      <p:nvGrpSpPr>
+        <p:cNvPr id="1" name=""/>
+        <p:cNvGrpSpPr/>
+        <p:nvPr/>
+      </p:nvGrpSpPr>
+      <p:grpSpPr>
+        <a:xfrm>
+          <a:off x="0" y="0"/>
+          <a:ext cx="0" cy="0"/>
+          <a:chOff x="0" y="0"/>
+          <a:chExt cx="0" cy="0"/>
+        </a:xfrm>
+      </p:grpSpPr>
+      <p:sp>
+        <p:nvSpPr>
+          <p:cNvPr id="2" name="Espaço Reservado para Conteúdo 1"/>
+          <p:cNvSpPr>
+            <a:spLocks noGrp="1"/>
+          </p:cNvSpPr>
+          <p:nvPr>
+            <p:ph idx="1"/>
+          </p:nvPr>
+        </p:nvSpPr>
+        <p:spPr/>
+        <p:txBody>
+          <a:bodyPr/>
+          <a:lstStyle/>
+          <a:p>
+            <a:r>
+              <a:rPr lang="pt-BR" dirty="0" err="1" smtClean="0"/>
+              <a:t>Performa</a:t>
+            </a:r>
+            <a:r>
+              <a:rPr lang="pt-BR" dirty="0" smtClean="0"/>
+              <a:t> uma análise de diversos algoritmos não supervisionados para detecção de ataques </a:t>
+            </a:r>
+            <a:r>
+              <a:rPr lang="pt-BR" dirty="0" err="1" smtClean="0"/>
+              <a:t>DDoS</a:t>
+            </a:r>
+            <a:endParaRPr lang="pt-BR" dirty="0" smtClean="0"/>
+          </a:p>
+          <a:p>
+            <a:r>
+              <a:rPr lang="pt-BR" dirty="0" smtClean="0"/>
+              <a:t>Interessante </a:t>
+            </a:r>
+            <a:r>
+              <a:rPr lang="pt-BR" dirty="0" err="1" smtClean="0"/>
+              <a:t>guideline</a:t>
+            </a:r>
+            <a:r>
+              <a:rPr lang="pt-BR" dirty="0" smtClean="0"/>
+              <a:t> para seleção prévia de TOS</a:t>
+            </a:r>
+            <a:endParaRPr lang="pt-BR" dirty="0"/>
+          </a:p>
+        </p:txBody>
+      </p:sp>
+      <p:sp>
+        <p:nvSpPr>
+          <p:cNvPr id="3" name="Espaço Reservado para Número de Slide 2"/>
+          <p:cNvSpPr>
+            <a:spLocks noGrp="1"/>
+          </p:cNvSpPr>
+          <p:nvPr>
+            <p:ph type="sldNum" sz="quarter" idx="12"/>
+          </p:nvPr>
+        </p:nvSpPr>
+        <p:spPr/>
+        <p:txBody>
+          <a:bodyPr/>
+          <a:lstStyle/>
+          <a:p>
+            <a:fld id="{60345120-F3F8-44AB-A502-72CB2236A7D5}" type="slidenum">
+              <a:rPr lang="pt-BR" smtClean="0"/>
+              <a:t>30</a:t>
+            </a:fld>
+            <a:endParaRPr lang="pt-BR"/>
+          </a:p>
+        </p:txBody>
+      </p:sp>
+      <p:sp>
+        <p:nvSpPr>
+          <p:cNvPr id="4" name="Título 3"/>
+          <p:cNvSpPr>
+            <a:spLocks noGrp="1"/>
+          </p:cNvSpPr>
+          <p:nvPr>
+            <p:ph type="title"/>
+          </p:nvPr>
+        </p:nvSpPr>
+        <p:spPr/>
+        <p:txBody>
+          <a:bodyPr/>
+          <a:lstStyle/>
+          <a:p>
+            <a:r>
+              <a:rPr lang="pt-BR" dirty="0" smtClean="0"/>
+              <a:t>Paralelo com TP</a:t>
+            </a:r>
+            <a:endParaRPr lang="pt-BR" dirty="0"/>
+          </a:p>
+        </p:txBody>
+      </p:sp>
+      <p:pic>
+        <p:nvPicPr>
+          <p:cNvPr id="3076" name="Picture 4" descr="Resultado de imagem para DDoS icon"/>
+          <p:cNvPicPr>
+            <a:picLocks noChangeAspect="1" noChangeArrowheads="1"/>
+          </p:cNvPicPr>
+          <p:nvPr/>
+        </p:nvPicPr>
+        <p:blipFill>
+          <a:blip r:embed="rId2">
+            <a:extLst>
+              <a:ext uri="{28A0092B-C50C-407E-A947-70E740481C1C}">
+                <a14:useLocalDpi xmlns:a14="http://schemas.microsoft.com/office/drawing/2010/main" val="0"/>
+              </a:ext>
+            </a:extLst>
+          </a:blip>
+          <a:srcRect/>
+          <a:stretch>
+            <a:fillRect/>
+          </a:stretch>
+        </p:blipFill>
+        <p:spPr bwMode="auto">
+          <a:xfrm>
+            <a:off x="4821665" y="3300931"/>
+            <a:ext cx="2548670" cy="2965725"/>
+          </a:xfrm>
+          <a:prstGeom prst="rect">
+            <a:avLst/>
+          </a:prstGeom>
+          <a:noFill/>
+          <a:extLst>
+            <a:ext uri="{909E8E84-426E-40DD-AFC4-6F175D3DCCD1}">
+              <a14:hiddenFill xmlns:a14="http://schemas.microsoft.com/office/drawing/2010/main">
+                <a:solidFill>
+                  <a:srgbClr val="FFFFFF"/>
+                </a:solidFill>
+              </a14:hiddenFill>
+            </a:ext>
+          </a:extLst>
+        </p:spPr>
+      </p:pic>
+    </p:spTree>
+    <p:extLst>
+      <p:ext uri="{BB962C8B-B14F-4D97-AF65-F5344CB8AC3E}">
+        <p14:creationId xmlns:p14="http://schemas.microsoft.com/office/powerpoint/2010/main" val="4217450238"/>
+      </p:ext>
+    </p:extLst>
+  </p:cSld>
+  <p:clrMapOvr>
+    <a:masterClrMapping/>
+  </p:clrMapOvr>
+</p:sld>
+</file>
+
+<file path=ppt/slides/slide31.xml><?xml version="1.0" encoding="utf-8"?>
+<p:sld xmlns:a="http://schemas.openxmlformats.org/drawingml/2006/main" xmlns:r="http://schemas.openxmlformats.org/officeDocument/2006/relationships" xmlns:p="http://schemas.openxmlformats.org/presentationml/2006/main">
+  <p:cSld>
+    <p:spTree>
+      <p:nvGrpSpPr>
+        <p:cNvPr id="1" name=""/>
+        <p:cNvGrpSpPr/>
+        <p:nvPr/>
+      </p:nvGrpSpPr>
+      <p:grpSpPr>
+        <a:xfrm>
+          <a:off x="0" y="0"/>
+          <a:ext cx="0" cy="0"/>
+          <a:chOff x="0" y="0"/>
+          <a:chExt cx="0" cy="0"/>
+        </a:xfrm>
+      </p:grpSpPr>
+      <p:sp>
+        <p:nvSpPr>
+          <p:cNvPr id="3" name="Espaço Reservado para Número de Slide 2"/>
+          <p:cNvSpPr>
+            <a:spLocks noGrp="1"/>
+          </p:cNvSpPr>
+          <p:nvPr>
+            <p:ph type="sldNum" sz="quarter" idx="12"/>
+          </p:nvPr>
+        </p:nvSpPr>
+        <p:spPr/>
+        <p:txBody>
+          <a:bodyPr/>
+          <a:lstStyle/>
+          <a:p>
+            <a:fld id="{60345120-F3F8-44AB-A502-72CB2236A7D5}" type="slidenum">
+              <a:rPr lang="pt-BR" smtClean="0"/>
+              <a:t>31</a:t>
+            </a:fld>
+            <a:endParaRPr lang="pt-BR"/>
+          </a:p>
+        </p:txBody>
+      </p:sp>
+      <p:sp>
+        <p:nvSpPr>
+          <p:cNvPr id="4" name="Título 3"/>
+          <p:cNvSpPr>
+            <a:spLocks noGrp="1"/>
+          </p:cNvSpPr>
+          <p:nvPr>
+            <p:ph type="title"/>
+          </p:nvPr>
+        </p:nvSpPr>
+        <p:spPr/>
+        <p:txBody>
+          <a:bodyPr/>
+          <a:lstStyle/>
+          <a:p>
+            <a:r>
+              <a:rPr lang="pt-BR" dirty="0" smtClean="0"/>
+              <a:t>Demonstração</a:t>
+            </a:r>
+            <a:endParaRPr lang="pt-BR" dirty="0"/>
+          </a:p>
+        </p:txBody>
+      </p:sp>
+      <p:pic>
+        <p:nvPicPr>
+          <p:cNvPr id="1030" name="Picture 6" descr="https://dadosedecisoes.com.br/wp-content/uploads/2018/04/jupyter_notebook.png"/>
+          <p:cNvPicPr>
+            <a:picLocks noChangeAspect="1" noChangeArrowheads="1"/>
+          </p:cNvPicPr>
+          <p:nvPr/>
+        </p:nvPicPr>
+        <p:blipFill>
+          <a:blip r:embed="rId2">
+            <a:extLst>
+              <a:ext uri="{28A0092B-C50C-407E-A947-70E740481C1C}">
+                <a14:useLocalDpi xmlns:a14="http://schemas.microsoft.com/office/drawing/2010/main" val="0"/>
+              </a:ext>
+            </a:extLst>
+          </a:blip>
+          <a:srcRect/>
+          <a:stretch>
+            <a:fillRect/>
+          </a:stretch>
+        </p:blipFill>
+        <p:spPr bwMode="auto">
+          <a:xfrm>
+            <a:off x="1554773" y="1704720"/>
+            <a:ext cx="9082454" cy="4510953"/>
+          </a:xfrm>
+          <a:prstGeom prst="rect">
+            <a:avLst/>
+          </a:prstGeom>
+          <a:noFill/>
+          <a:extLst>
+            <a:ext uri="{909E8E84-426E-40DD-AFC4-6F175D3DCCD1}">
+              <a14:hiddenFill xmlns:a14="http://schemas.microsoft.com/office/drawing/2010/main">
+                <a:solidFill>
+                  <a:srgbClr val="FFFFFF"/>
+                </a:solidFill>
+              </a14:hiddenFill>
+            </a:ext>
+          </a:extLst>
+        </p:spPr>
+      </p:pic>
+    </p:spTree>
+    <p:extLst>
+      <p:ext uri="{BB962C8B-B14F-4D97-AF65-F5344CB8AC3E}">
+        <p14:creationId xmlns:p14="http://schemas.microsoft.com/office/powerpoint/2010/main" val="3477992795"/>
+      </p:ext>
+    </p:extLst>
+  </p:cSld>
+  <p:clrMapOvr>
+    <a:masterClrMapping/>
+  </p:clrMapOvr>
+</p:sld>
+</file>
+
+<file path=ppt/slides/slide32.xml><?xml version="1.0" encoding="utf-8"?>
+<p:sld xmlns:a="http://schemas.openxmlformats.org/drawingml/2006/main" xmlns:r="http://schemas.openxmlformats.org/officeDocument/2006/relationships" xmlns:p="http://schemas.openxmlformats.org/presentationml/2006/main">
+  <p:cSld>
+    <p:spTree>
+      <p:nvGrpSpPr>
+        <p:cNvPr id="1" name=""/>
+        <p:cNvGrpSpPr/>
+        <p:nvPr/>
+      </p:nvGrpSpPr>
+      <p:grpSpPr>
+        <a:xfrm>
+          <a:off x="0" y="0"/>
+          <a:ext cx="0" cy="0"/>
+          <a:chOff x="0" y="0"/>
+          <a:chExt cx="0" cy="0"/>
+        </a:xfrm>
+      </p:grpSpPr>
+      <p:sp>
+        <p:nvSpPr>
+          <p:cNvPr id="2" name="Espaço Reservado para Conteúdo 1"/>
+          <p:cNvSpPr>
+            <a:spLocks noGrp="1"/>
+          </p:cNvSpPr>
+          <p:nvPr>
+            <p:ph idx="1"/>
+          </p:nvPr>
+        </p:nvSpPr>
+        <p:spPr>
+          <a:xfrm>
+            <a:off x="838200" y="5263661"/>
+            <a:ext cx="10515600" cy="914401"/>
+          </a:xfrm>
+        </p:spPr>
+        <p:txBody>
+          <a:bodyPr>
+            <a:normAutofit/>
+          </a:bodyPr>
+          <a:lstStyle/>
+          <a:p>
+            <a:pPr marL="0" indent="0" algn="ctr">
+              <a:buNone/>
+            </a:pPr>
+            <a:r>
+              <a:rPr lang="pt-BR" dirty="0" smtClean="0"/>
+              <a:t>Link</a:t>
+            </a:r>
+          </a:p>
+          <a:p>
+            <a:pPr marL="0" indent="0" algn="ctr">
+              <a:buNone/>
+            </a:pPr>
+            <a:r>
+              <a:rPr lang="pt-BR" sz="1800" dirty="0" smtClean="0"/>
+              <a:t>*Posteriormente será disponibilizado no GitHub</a:t>
+            </a:r>
+            <a:endParaRPr lang="pt-BR" sz="1800" dirty="0"/>
+          </a:p>
+        </p:txBody>
+      </p:sp>
+      <p:sp>
+        <p:nvSpPr>
+          <p:cNvPr id="3" name="Espaço Reservado para Número de Slide 2"/>
+          <p:cNvSpPr>
+            <a:spLocks noGrp="1"/>
+          </p:cNvSpPr>
+          <p:nvPr>
+            <p:ph type="sldNum" sz="quarter" idx="12"/>
+          </p:nvPr>
+        </p:nvSpPr>
+        <p:spPr/>
+        <p:txBody>
+          <a:bodyPr/>
+          <a:lstStyle/>
+          <a:p>
+            <a:fld id="{60345120-F3F8-44AB-A502-72CB2236A7D5}" type="slidenum">
+              <a:rPr lang="pt-BR" smtClean="0"/>
+              <a:t>32</a:t>
+            </a:fld>
+            <a:endParaRPr lang="pt-BR"/>
+          </a:p>
+        </p:txBody>
+      </p:sp>
+      <p:sp>
+        <p:nvSpPr>
+          <p:cNvPr id="4" name="Título 3"/>
+          <p:cNvSpPr>
+            <a:spLocks noGrp="1"/>
+          </p:cNvSpPr>
+          <p:nvPr>
+            <p:ph type="title"/>
+          </p:nvPr>
+        </p:nvSpPr>
+        <p:spPr/>
+        <p:txBody>
+          <a:bodyPr/>
+          <a:lstStyle/>
+          <a:p>
+            <a:r>
+              <a:rPr lang="pt-BR" dirty="0" smtClean="0"/>
+              <a:t>Código</a:t>
+            </a:r>
+            <a:endParaRPr lang="pt-BR" dirty="0"/>
+          </a:p>
+        </p:txBody>
+      </p:sp>
+      <p:pic>
+        <p:nvPicPr>
+          <p:cNvPr id="2050" name="Picture 2" descr="Resultado de imagem para google drive"/>
+          <p:cNvPicPr>
+            <a:picLocks noChangeAspect="1" noChangeArrowheads="1"/>
+          </p:cNvPicPr>
+          <p:nvPr/>
+        </p:nvPicPr>
+        <p:blipFill>
+          <a:blip r:embed="rId3">
+            <a:extLst>
+              <a:ext uri="{28A0092B-C50C-407E-A947-70E740481C1C}">
+                <a14:useLocalDpi xmlns:a14="http://schemas.microsoft.com/office/drawing/2010/main" val="0"/>
+              </a:ext>
+            </a:extLst>
+          </a:blip>
+          <a:srcRect/>
+          <a:stretch>
+            <a:fillRect/>
+          </a:stretch>
+        </p:blipFill>
+        <p:spPr bwMode="auto">
+          <a:xfrm>
+            <a:off x="3605830" y="2071994"/>
+            <a:ext cx="4980339" cy="2796808"/>
+          </a:xfrm>
+          <a:prstGeom prst="rect">
+            <a:avLst/>
+          </a:prstGeom>
+          <a:noFill/>
+          <a:extLst>
+            <a:ext uri="{909E8E84-426E-40DD-AFC4-6F175D3DCCD1}">
+              <a14:hiddenFill xmlns:a14="http://schemas.microsoft.com/office/drawing/2010/main">
+                <a:solidFill>
+                  <a:srgbClr val="FFFFFF"/>
+                </a:solidFill>
+              </a14:hiddenFill>
+            </a:ext>
+          </a:extLst>
+        </p:spPr>
+      </p:pic>
+    </p:spTree>
+    <p:extLst>
+      <p:ext uri="{BB962C8B-B14F-4D97-AF65-F5344CB8AC3E}">
+        <p14:creationId xmlns:p14="http://schemas.microsoft.com/office/powerpoint/2010/main" val="4077210692"/>
+      </p:ext>
+    </p:extLst>
+  </p:cSld>
+  <p:clrMapOvr>
+    <a:masterClrMapping/>
+  </p:clrMapOvr>
+</p:sld>
+</file>
+
+<file path=ppt/slides/slide33.xml><?xml version="1.0" encoding="utf-8"?>
+<p:sld xmlns:a="http://schemas.openxmlformats.org/drawingml/2006/main" xmlns:r="http://schemas.openxmlformats.org/officeDocument/2006/relationships" xmlns:p="http://schemas.openxmlformats.org/presentationml/2006/main">
+  <p:cSld>
+    <p:spTree>
+      <p:nvGrpSpPr>
+        <p:cNvPr id="1" name=""/>
+        <p:cNvGrpSpPr/>
+        <p:nvPr/>
+      </p:nvGrpSpPr>
+      <p:grpSpPr>
+        <a:xfrm>
+          <a:off x="0" y="0"/>
+          <a:ext cx="0" cy="0"/>
+          <a:chOff x="0" y="0"/>
+          <a:chExt cx="0" cy="0"/>
+        </a:xfrm>
+      </p:grpSpPr>
+      <p:sp>
+        <p:nvSpPr>
           <p:cNvPr id="3" name="Título 2"/>
           <p:cNvSpPr>
             <a:spLocks noGrp="1"/>
@@ -5941,7 +9270,7 @@
           <a:p>
             <a:fld id="{60345120-F3F8-44AB-A502-72CB2236A7D5}" type="slidenum">
               <a:rPr lang="pt-BR" smtClean="0"/>
-              <a:t>17</a:t>
+              <a:t>33</a:t>
             </a:fld>
             <a:endParaRPr lang="pt-BR"/>
           </a:p>
@@ -5967,7 +9296,7 @@
 </p:sld>
 </file>
 
-<file path=ppt/slides/slide18.xml><?xml version="1.0" encoding="utf-8"?>
+<file path=ppt/slides/slide34.xml><?xml version="1.0" encoding="utf-8"?>
 <p:sld xmlns:a="http://schemas.openxmlformats.org/drawingml/2006/main" xmlns:r="http://schemas.openxmlformats.org/officeDocument/2006/relationships" xmlns:p="http://schemas.openxmlformats.org/presentationml/2006/main">
   <p:cSld>
     <p:spTree>
@@ -6297,210 +9626,6 @@
 </p:sld>
 </file>
 
-<file path=ppt/slides/slide2.xml><?xml version="1.0" encoding="utf-8"?>
-<p:sld xmlns:a="http://schemas.openxmlformats.org/drawingml/2006/main" xmlns:r="http://schemas.openxmlformats.org/officeDocument/2006/relationships" xmlns:p="http://schemas.openxmlformats.org/presentationml/2006/main">
-  <p:cSld>
-    <p:spTree>
-      <p:nvGrpSpPr>
-        <p:cNvPr id="1" name=""/>
-        <p:cNvGrpSpPr/>
-        <p:nvPr/>
-      </p:nvGrpSpPr>
-      <p:grpSpPr>
-        <a:xfrm>
-          <a:off x="0" y="0"/>
-          <a:ext cx="0" cy="0"/>
-          <a:chOff x="0" y="0"/>
-          <a:chExt cx="0" cy="0"/>
-        </a:xfrm>
-      </p:grpSpPr>
-      <p:sp>
-        <p:nvSpPr>
-          <p:cNvPr id="3" name="Título 2"/>
-          <p:cNvSpPr>
-            <a:spLocks noGrp="1"/>
-          </p:cNvSpPr>
-          <p:nvPr>
-            <p:ph type="title"/>
-          </p:nvPr>
-        </p:nvSpPr>
-        <p:spPr/>
-        <p:txBody>
-          <a:bodyPr>
-            <a:normAutofit/>
-          </a:bodyPr>
-          <a:lstStyle/>
-          <a:p>
-            <a:r>
-              <a:rPr lang="pt-BR" dirty="0"/>
-              <a:t>Motivação</a:t>
-            </a:r>
-          </a:p>
-        </p:txBody>
-      </p:sp>
-      <p:sp>
-        <p:nvSpPr>
-          <p:cNvPr id="8" name="Espaço Reservado para Número de Slide 7"/>
-          <p:cNvSpPr>
-            <a:spLocks noGrp="1"/>
-          </p:cNvSpPr>
-          <p:nvPr>
-            <p:ph type="sldNum" sz="quarter" idx="12"/>
-          </p:nvPr>
-        </p:nvSpPr>
-        <p:spPr/>
-        <p:txBody>
-          <a:bodyPr/>
-          <a:lstStyle/>
-          <a:p>
-            <a:fld id="{60345120-F3F8-44AB-A502-72CB2236A7D5}" type="slidenum">
-              <a:rPr lang="pt-BR" smtClean="0"/>
-              <a:t>2</a:t>
-            </a:fld>
-            <a:endParaRPr lang="pt-BR"/>
-          </a:p>
-        </p:txBody>
-      </p:sp>
-      <p:sp>
-        <p:nvSpPr>
-          <p:cNvPr id="2" name="Espaço Reservado para Conteúdo 1"/>
-          <p:cNvSpPr>
-            <a:spLocks noGrp="1"/>
-          </p:cNvSpPr>
-          <p:nvPr>
-            <p:ph idx="1"/>
-          </p:nvPr>
-        </p:nvSpPr>
-        <p:spPr/>
-        <p:txBody>
-          <a:bodyPr/>
-          <a:lstStyle/>
-          <a:p>
-            <a:endParaRPr lang="pt-BR" dirty="0"/>
-          </a:p>
-        </p:txBody>
-      </p:sp>
-    </p:spTree>
-    <p:extLst>
-      <p:ext uri="{BB962C8B-B14F-4D97-AF65-F5344CB8AC3E}">
-        <p14:creationId xmlns:p14="http://schemas.microsoft.com/office/powerpoint/2010/main" val="3864786897"/>
-      </p:ext>
-    </p:extLst>
-  </p:cSld>
-  <p:clrMapOvr>
-    <a:masterClrMapping/>
-  </p:clrMapOvr>
-  <p:timing>
-    <p:tnLst>
-      <p:par>
-        <p:cTn id="1" dur="indefinite" restart="never" nodeType="tmRoot"/>
-      </p:par>
-    </p:tnLst>
-  </p:timing>
-</p:sld>
-</file>
-
-<file path=ppt/slides/slide3.xml><?xml version="1.0" encoding="utf-8"?>
-<p:sld xmlns:a="http://schemas.openxmlformats.org/drawingml/2006/main" xmlns:r="http://schemas.openxmlformats.org/officeDocument/2006/relationships" xmlns:p="http://schemas.openxmlformats.org/presentationml/2006/main">
-  <p:cSld>
-    <p:spTree>
-      <p:nvGrpSpPr>
-        <p:cNvPr id="1" name=""/>
-        <p:cNvGrpSpPr/>
-        <p:nvPr/>
-      </p:nvGrpSpPr>
-      <p:grpSpPr>
-        <a:xfrm>
-          <a:off x="0" y="0"/>
-          <a:ext cx="0" cy="0"/>
-          <a:chOff x="0" y="0"/>
-          <a:chExt cx="0" cy="0"/>
-        </a:xfrm>
-      </p:grpSpPr>
-      <p:sp>
-        <p:nvSpPr>
-          <p:cNvPr id="2" name="Espaço Reservado para Conteúdo 1"/>
-          <p:cNvSpPr>
-            <a:spLocks noGrp="1"/>
-          </p:cNvSpPr>
-          <p:nvPr>
-            <p:ph idx="1"/>
-          </p:nvPr>
-        </p:nvSpPr>
-        <p:spPr/>
-        <p:txBody>
-          <a:bodyPr/>
-          <a:lstStyle/>
-          <a:p>
-            <a:endParaRPr lang="pt-BR"/>
-          </a:p>
-        </p:txBody>
-      </p:sp>
-      <p:sp>
-        <p:nvSpPr>
-          <p:cNvPr id="3" name="Espaço Reservado para Número de Slide 2"/>
-          <p:cNvSpPr>
-            <a:spLocks noGrp="1"/>
-          </p:cNvSpPr>
-          <p:nvPr>
-            <p:ph type="sldNum" sz="quarter" idx="12"/>
-          </p:nvPr>
-        </p:nvSpPr>
-        <p:spPr/>
-        <p:txBody>
-          <a:bodyPr/>
-          <a:lstStyle/>
-          <a:p>
-            <a:fld id="{60345120-F3F8-44AB-A502-72CB2236A7D5}" type="slidenum">
-              <a:rPr lang="pt-BR" smtClean="0"/>
-              <a:t>3</a:t>
-            </a:fld>
-            <a:endParaRPr lang="pt-BR"/>
-          </a:p>
-        </p:txBody>
-      </p:sp>
-      <p:sp>
-        <p:nvSpPr>
-          <p:cNvPr id="4" name="Título 3"/>
-          <p:cNvSpPr>
-            <a:spLocks noGrp="1"/>
-          </p:cNvSpPr>
-          <p:nvPr>
-            <p:ph type="title"/>
-          </p:nvPr>
-        </p:nvSpPr>
-        <p:spPr/>
-        <p:txBody>
-          <a:bodyPr/>
-          <a:lstStyle/>
-          <a:p>
-            <a:r>
-              <a:rPr lang="pt-BR" dirty="0"/>
-              <a:t>Objetivo</a:t>
-            </a:r>
-          </a:p>
-        </p:txBody>
-      </p:sp>
-    </p:spTree>
-    <p:extLst>
-      <p:ext uri="{BB962C8B-B14F-4D97-AF65-F5344CB8AC3E}">
-        <p14:creationId xmlns:p14="http://schemas.microsoft.com/office/powerpoint/2010/main" val="72020261"/>
-      </p:ext>
-    </p:extLst>
-  </p:cSld>
-  <p:clrMapOvr>
-    <a:masterClrMapping/>
-  </p:clrMapOvr>
-  <p:timing>
-    <p:tnLst>
-      <p:par>
-        <p:cTn id="1" dur="indefinite" restart="never" nodeType="tmRoot"/>
-      </p:par>
-    </p:tnLst>
-  </p:timing>
-</p:sld>
-</file>
-
 <file path=ppt/slides/slide4.xml><?xml version="1.0" encoding="utf-8"?>
 <p:sld xmlns:a="http://schemas.openxmlformats.org/drawingml/2006/main" xmlns:r="http://schemas.openxmlformats.org/officeDocument/2006/relationships" xmlns:p="http://schemas.openxmlformats.org/presentationml/2006/main">
   <p:cSld>
@@ -6520,26 +9645,31 @@
       </p:grpSpPr>
       <p:sp>
         <p:nvSpPr>
-          <p:cNvPr id="2" name="Espaço Reservado para Conteúdo 1"/>
-          <p:cNvSpPr>
-            <a:spLocks noGrp="1"/>
-          </p:cNvSpPr>
-          <p:nvPr>
-            <p:ph idx="1"/>
-          </p:nvPr>
-        </p:nvSpPr>
-        <p:spPr/>
-        <p:txBody>
-          <a:bodyPr/>
-          <a:lstStyle/>
-          <a:p>
-            <a:endParaRPr lang="pt-BR"/>
-          </a:p>
-        </p:txBody>
-      </p:sp>
-      <p:sp>
-        <p:nvSpPr>
-          <p:cNvPr id="3" name="Espaço Reservado para Número de Slide 2"/>
+          <p:cNvPr id="3" name="Título 2"/>
+          <p:cNvSpPr>
+            <a:spLocks noGrp="1"/>
+          </p:cNvSpPr>
+          <p:nvPr>
+            <p:ph type="title"/>
+          </p:nvPr>
+        </p:nvSpPr>
+        <p:spPr/>
+        <p:txBody>
+          <a:bodyPr>
+            <a:normAutofit/>
+          </a:bodyPr>
+          <a:lstStyle/>
+          <a:p>
+            <a:r>
+              <a:rPr lang="pt-BR" dirty="0"/>
+              <a:t>Motivação</a:t>
+            </a:r>
+          </a:p>
+        </p:txBody>
+      </p:sp>
+      <p:sp>
+        <p:nvSpPr>
+          <p:cNvPr id="8" name="Espaço Reservado para Número de Slide 7"/>
           <p:cNvSpPr>
             <a:spLocks noGrp="1"/>
           </p:cNvSpPr>
@@ -6562,30 +9692,80 @@
       </p:sp>
       <p:sp>
         <p:nvSpPr>
-          <p:cNvPr id="4" name="Título 3"/>
-          <p:cNvSpPr>
-            <a:spLocks noGrp="1"/>
-          </p:cNvSpPr>
-          <p:nvPr>
-            <p:ph type="title"/>
-          </p:nvPr>
-        </p:nvSpPr>
-        <p:spPr/>
-        <p:txBody>
-          <a:bodyPr/>
-          <a:lstStyle/>
-          <a:p>
-            <a:r>
-              <a:rPr lang="pt-BR" dirty="0"/>
-              <a:t>Trabalho Relatado</a:t>
-            </a:r>
+          <p:cNvPr id="2" name="Espaço Reservado para Conteúdo 1"/>
+          <p:cNvSpPr>
+            <a:spLocks noGrp="1"/>
+          </p:cNvSpPr>
+          <p:nvPr>
+            <p:ph idx="1"/>
+          </p:nvPr>
+        </p:nvSpPr>
+        <p:spPr>
+          <a:xfrm>
+            <a:off x="838200" y="2379785"/>
+            <a:ext cx="10515600" cy="3797178"/>
+          </a:xfrm>
+        </p:spPr>
+        <p:txBody>
+          <a:bodyPr>
+            <a:normAutofit/>
+          </a:bodyPr>
+          <a:lstStyle/>
+          <a:p>
+            <a:r>
+              <a:rPr lang="pt-BR" sz="3200" dirty="0" smtClean="0"/>
+              <a:t>Algoritmos não supervisionados são ótimos em identificar padrões complexos</a:t>
+            </a:r>
+          </a:p>
+          <a:p>
+            <a:r>
+              <a:rPr lang="pt-BR" sz="3200" dirty="0" smtClean="0"/>
+              <a:t>Outros algoritmos semelhantes utilizam </a:t>
+            </a:r>
+            <a:r>
+              <a:rPr lang="pt-BR" sz="3200" dirty="0" err="1" smtClean="0"/>
+              <a:t>Easy</a:t>
+            </a:r>
+            <a:r>
+              <a:rPr lang="pt-BR" sz="3200" dirty="0" smtClean="0"/>
+              <a:t> </a:t>
+            </a:r>
+            <a:r>
+              <a:rPr lang="pt-BR" sz="3200" dirty="0" err="1" smtClean="0"/>
+              <a:t>Essemble</a:t>
+            </a:r>
+            <a:r>
+              <a:rPr lang="pt-BR" sz="3200" dirty="0" smtClean="0"/>
+              <a:t> para lidar com </a:t>
+            </a:r>
+            <a:r>
+              <a:rPr lang="pt-BR" sz="3200" dirty="0" err="1" smtClean="0"/>
+              <a:t>datasets</a:t>
+            </a:r>
+            <a:r>
+              <a:rPr lang="pt-BR" sz="3200" dirty="0" smtClean="0"/>
+              <a:t> </a:t>
+            </a:r>
+            <a:r>
+              <a:rPr lang="pt-BR" sz="3200" dirty="0" err="1" smtClean="0"/>
+              <a:t>desbalaceados</a:t>
+            </a:r>
+            <a:r>
+              <a:rPr lang="pt-BR" sz="3200" dirty="0"/>
+              <a:t> </a:t>
+            </a:r>
+            <a:r>
+              <a:rPr lang="pt-BR" sz="3200" dirty="0" smtClean="0"/>
+              <a:t>-&gt; custoso</a:t>
+            </a:r>
+            <a:endParaRPr lang="pt-BR" sz="3200" dirty="0"/>
           </a:p>
         </p:txBody>
       </p:sp>
     </p:spTree>
     <p:extLst>
       <p:ext uri="{BB962C8B-B14F-4D97-AF65-F5344CB8AC3E}">
-        <p14:creationId xmlns:p14="http://schemas.microsoft.com/office/powerpoint/2010/main" val="1450861679"/>
+        <p14:creationId xmlns:p14="http://schemas.microsoft.com/office/powerpoint/2010/main" val="3864786897"/>
       </p:ext>
     </p:extLst>
   </p:cSld>
@@ -6629,6 +9809,130 @@
             <p:ph idx="1"/>
           </p:nvPr>
         </p:nvSpPr>
+        <p:spPr>
+          <a:xfrm>
+            <a:off x="838200" y="2473569"/>
+            <a:ext cx="10515600" cy="3703393"/>
+          </a:xfrm>
+        </p:spPr>
+        <p:txBody>
+          <a:bodyPr>
+            <a:normAutofit/>
+          </a:bodyPr>
+          <a:lstStyle/>
+          <a:p>
+            <a:r>
+              <a:rPr lang="pt-BR" sz="3200" dirty="0" smtClean="0"/>
+              <a:t>Testar outro algoritmo como classificador final</a:t>
+            </a:r>
+          </a:p>
+          <a:p>
+            <a:r>
+              <a:rPr lang="pt-BR" sz="3200" dirty="0" smtClean="0"/>
+              <a:t>Avaliar diferentes seleções de algoritmos não supervisionados</a:t>
+            </a:r>
+          </a:p>
+          <a:p>
+            <a:r>
+              <a:rPr lang="pt-BR" sz="3200" dirty="0" smtClean="0"/>
+              <a:t>Desenvolver um método de seleção de algoritmos não supervisionados para o classificador final</a:t>
+            </a:r>
+          </a:p>
+        </p:txBody>
+      </p:sp>
+      <p:sp>
+        <p:nvSpPr>
+          <p:cNvPr id="3" name="Espaço Reservado para Número de Slide 2"/>
+          <p:cNvSpPr>
+            <a:spLocks noGrp="1"/>
+          </p:cNvSpPr>
+          <p:nvPr>
+            <p:ph type="sldNum" sz="quarter" idx="12"/>
+          </p:nvPr>
+        </p:nvSpPr>
+        <p:spPr/>
+        <p:txBody>
+          <a:bodyPr/>
+          <a:lstStyle/>
+          <a:p>
+            <a:fld id="{60345120-F3F8-44AB-A502-72CB2236A7D5}" type="slidenum">
+              <a:rPr lang="pt-BR" smtClean="0"/>
+              <a:t>5</a:t>
+            </a:fld>
+            <a:endParaRPr lang="pt-BR"/>
+          </a:p>
+        </p:txBody>
+      </p:sp>
+      <p:sp>
+        <p:nvSpPr>
+          <p:cNvPr id="4" name="Título 3"/>
+          <p:cNvSpPr>
+            <a:spLocks noGrp="1"/>
+          </p:cNvSpPr>
+          <p:nvPr>
+            <p:ph type="title"/>
+          </p:nvPr>
+        </p:nvSpPr>
+        <p:spPr/>
+        <p:txBody>
+          <a:bodyPr/>
+          <a:lstStyle/>
+          <a:p>
+            <a:r>
+              <a:rPr lang="pt-BR" dirty="0" smtClean="0"/>
+              <a:t>Proposta</a:t>
+            </a:r>
+            <a:endParaRPr lang="pt-BR" dirty="0"/>
+          </a:p>
+        </p:txBody>
+      </p:sp>
+    </p:spTree>
+    <p:extLst>
+      <p:ext uri="{BB962C8B-B14F-4D97-AF65-F5344CB8AC3E}">
+        <p14:creationId xmlns:p14="http://schemas.microsoft.com/office/powerpoint/2010/main" val="72020261"/>
+      </p:ext>
+    </p:extLst>
+  </p:cSld>
+  <p:clrMapOvr>
+    <a:masterClrMapping/>
+  </p:clrMapOvr>
+  <p:timing>
+    <p:tnLst>
+      <p:par>
+        <p:cTn id="1" dur="indefinite" restart="never" nodeType="tmRoot"/>
+      </p:par>
+    </p:tnLst>
+  </p:timing>
+</p:sld>
+</file>
+
+<file path=ppt/slides/slide6.xml><?xml version="1.0" encoding="utf-8"?>
+<p:sld xmlns:a="http://schemas.openxmlformats.org/drawingml/2006/main" xmlns:r="http://schemas.openxmlformats.org/officeDocument/2006/relationships" xmlns:p="http://schemas.openxmlformats.org/presentationml/2006/main">
+  <p:cSld>
+    <p:spTree>
+      <p:nvGrpSpPr>
+        <p:cNvPr id="1" name=""/>
+        <p:cNvGrpSpPr/>
+        <p:nvPr/>
+      </p:nvGrpSpPr>
+      <p:grpSpPr>
+        <a:xfrm>
+          <a:off x="0" y="0"/>
+          <a:ext cx="0" cy="0"/>
+          <a:chOff x="0" y="0"/>
+          <a:chExt cx="0" cy="0"/>
+        </a:xfrm>
+      </p:grpSpPr>
+      <p:sp>
+        <p:nvSpPr>
+          <p:cNvPr id="2" name="Espaço Reservado para Conteúdo 1"/>
+          <p:cNvSpPr>
+            <a:spLocks noGrp="1"/>
+          </p:cNvSpPr>
+          <p:nvPr>
+            <p:ph idx="1"/>
+          </p:nvPr>
+        </p:nvSpPr>
         <p:spPr/>
         <p:txBody>
           <a:bodyPr/>
@@ -6660,7 +9964,7 @@
           <a:p>
             <a:fld id="{60345120-F3F8-44AB-A502-72CB2236A7D5}" type="slidenum">
               <a:rPr lang="pt-BR" smtClean="0"/>
-              <a:t>5</a:t>
+              <a:t>6</a:t>
             </a:fld>
             <a:endParaRPr lang="pt-BR"/>
           </a:p>
@@ -6743,7 +10047,7 @@
 </p:sld>
 </file>
 
-<file path=ppt/slides/slide6.xml><?xml version="1.0" encoding="utf-8"?>
+<file path=ppt/slides/slide7.xml><?xml version="1.0" encoding="utf-8"?>
 <p:sld xmlns:a="http://schemas.openxmlformats.org/drawingml/2006/main" xmlns:r="http://schemas.openxmlformats.org/officeDocument/2006/relationships" xmlns:p="http://schemas.openxmlformats.org/presentationml/2006/main">
   <p:cSld>
     <p:spTree>
@@ -6777,7 +10081,7 @@
           <a:p>
             <a:fld id="{60345120-F3F8-44AB-A502-72CB2236A7D5}" type="slidenum">
               <a:rPr lang="pt-BR" smtClean="0"/>
-              <a:t>6</a:t>
+              <a:t>7</a:t>
             </a:fld>
             <a:endParaRPr lang="pt-BR"/>
           </a:p>
@@ -6857,7 +10161,7 @@
 </p:sld>
 </file>
 
-<file path=ppt/slides/slide7.xml><?xml version="1.0" encoding="utf-8"?>
+<file path=ppt/slides/slide8.xml><?xml version="1.0" encoding="utf-8"?>
 <p:sld xmlns:a="http://schemas.openxmlformats.org/drawingml/2006/main" xmlns:r="http://schemas.openxmlformats.org/officeDocument/2006/relationships" xmlns:p="http://schemas.openxmlformats.org/presentationml/2006/main">
   <p:cSld>
     <p:spTree>
@@ -7025,7 +10329,7 @@
           <a:p>
             <a:fld id="{60345120-F3F8-44AB-A502-72CB2236A7D5}" type="slidenum">
               <a:rPr lang="pt-BR" smtClean="0"/>
-              <a:t>7</a:t>
+              <a:t>8</a:t>
             </a:fld>
             <a:endParaRPr lang="pt-BR"/>
           </a:p>
@@ -7195,138 +10499,6 @@
 </p:sld>
 </file>
 
-<file path=ppt/slides/slide8.xml><?xml version="1.0" encoding="utf-8"?>
-<p:sld xmlns:a="http://schemas.openxmlformats.org/drawingml/2006/main" xmlns:r="http://schemas.openxmlformats.org/officeDocument/2006/relationships" xmlns:p="http://schemas.openxmlformats.org/presentationml/2006/main">
-  <p:cSld>
-    <p:spTree>
-      <p:nvGrpSpPr>
-        <p:cNvPr id="1" name=""/>
-        <p:cNvGrpSpPr/>
-        <p:nvPr/>
-      </p:nvGrpSpPr>
-      <p:grpSpPr>
-        <a:xfrm>
-          <a:off x="0" y="0"/>
-          <a:ext cx="0" cy="0"/>
-          <a:chOff x="0" y="0"/>
-          <a:chExt cx="0" cy="0"/>
-        </a:xfrm>
-      </p:grpSpPr>
-      <p:sp>
-        <p:nvSpPr>
-          <p:cNvPr id="2" name="Espaço Reservado para Conteúdo 1"/>
-          <p:cNvSpPr>
-            <a:spLocks noGrp="1"/>
-          </p:cNvSpPr>
-          <p:nvPr>
-            <p:ph idx="1"/>
-          </p:nvPr>
-        </p:nvSpPr>
-        <p:spPr>
-          <a:xfrm>
-            <a:off x="838200" y="2004645"/>
-            <a:ext cx="10515600" cy="4172317"/>
-          </a:xfrm>
-        </p:spPr>
-        <p:txBody>
-          <a:bodyPr/>
-          <a:lstStyle/>
-          <a:p>
-            <a:r>
-              <a:rPr lang="pt-BR" dirty="0"/>
-              <a:t>Trade-off entre Diversidade X Acurácia</a:t>
-            </a:r>
-          </a:p>
-          <a:p>
-            <a:r>
-              <a:rPr lang="pt-BR" dirty="0"/>
-              <a:t>Utilizar detectores distintos melhoram a diversidade, mas com os risco de degradar a capacidade de predição</a:t>
-            </a:r>
-          </a:p>
-          <a:p>
-            <a:r>
-              <a:rPr lang="pt-BR" dirty="0"/>
-              <a:t>Portanto um equilíbrio entre diversidade e acurácia deve ser mantido para se conseguir melhores resultados</a:t>
-            </a:r>
-          </a:p>
-          <a:p>
-            <a:r>
-              <a:rPr lang="pt-BR" dirty="0"/>
-              <a:t>Neste estudo, diferentes tipos de métodos não-supervisionados foram utilizados e seus parâmetros trocados para gerar uma maior variação</a:t>
-            </a:r>
-          </a:p>
-          <a:p>
-            <a:endParaRPr lang="pt-BR" dirty="0"/>
-          </a:p>
-        </p:txBody>
-      </p:sp>
-      <p:sp>
-        <p:nvSpPr>
-          <p:cNvPr id="3" name="Espaço Reservado para Número de Slide 2"/>
-          <p:cNvSpPr>
-            <a:spLocks noGrp="1"/>
-          </p:cNvSpPr>
-          <p:nvPr>
-            <p:ph type="sldNum" sz="quarter" idx="12"/>
-          </p:nvPr>
-        </p:nvSpPr>
-        <p:spPr/>
-        <p:txBody>
-          <a:bodyPr/>
-          <a:lstStyle/>
-          <a:p>
-            <a:fld id="{60345120-F3F8-44AB-A502-72CB2236A7D5}" type="slidenum">
-              <a:rPr lang="pt-BR" smtClean="0"/>
-              <a:t>8</a:t>
-            </a:fld>
-            <a:endParaRPr lang="pt-BR"/>
-          </a:p>
-        </p:txBody>
-      </p:sp>
-      <p:sp>
-        <p:nvSpPr>
-          <p:cNvPr id="4" name="Título 3"/>
-          <p:cNvSpPr>
-            <a:spLocks noGrp="1"/>
-          </p:cNvSpPr>
-          <p:nvPr>
-            <p:ph type="title"/>
-          </p:nvPr>
-        </p:nvSpPr>
-        <p:spPr/>
-        <p:txBody>
-          <a:bodyPr>
-            <a:normAutofit fontScale="90000"/>
-          </a:bodyPr>
-          <a:lstStyle/>
-          <a:p>
-            <a:r>
-              <a:rPr lang="pt-BR" dirty="0"/>
-              <a:t>Fase 1: Representação do Aprendizado não-supervisionado</a:t>
-            </a:r>
-          </a:p>
-        </p:txBody>
-      </p:sp>
-    </p:spTree>
-    <p:extLst>
-      <p:ext uri="{BB962C8B-B14F-4D97-AF65-F5344CB8AC3E}">
-        <p14:creationId xmlns:p14="http://schemas.microsoft.com/office/powerpoint/2010/main" val="2594379510"/>
-      </p:ext>
-    </p:extLst>
-  </p:cSld>
-  <p:clrMapOvr>
-    <a:masterClrMapping/>
-  </p:clrMapOvr>
-  <p:timing>
-    <p:tnLst>
-      <p:par>
-        <p:cTn id="1" dur="indefinite" restart="never" nodeType="tmRoot"/>
-      </p:par>
-    </p:tnLst>
-  </p:timing>
-</p:sld>
-</file>
-
 <file path=ppt/slides/slide9.xml><?xml version="1.0" encoding="utf-8"?>
 <p:sld xmlns:a="http://schemas.openxmlformats.org/drawingml/2006/main" xmlns:r="http://schemas.openxmlformats.org/officeDocument/2006/relationships" xmlns:p="http://schemas.openxmlformats.org/presentationml/2006/main">
   <p:cSld>
@@ -7346,6 +10518,54 @@
       </p:grpSpPr>
       <p:sp>
         <p:nvSpPr>
+          <p:cNvPr id="2" name="Espaço Reservado para Conteúdo 1"/>
+          <p:cNvSpPr>
+            <a:spLocks noGrp="1"/>
+          </p:cNvSpPr>
+          <p:nvPr>
+            <p:ph idx="1"/>
+          </p:nvPr>
+        </p:nvSpPr>
+        <p:spPr>
+          <a:xfrm>
+            <a:off x="838200" y="2004645"/>
+            <a:ext cx="10515600" cy="4172317"/>
+          </a:xfrm>
+        </p:spPr>
+        <p:txBody>
+          <a:bodyPr/>
+          <a:lstStyle/>
+          <a:p>
+            <a:r>
+              <a:rPr lang="pt-BR" dirty="0"/>
+              <a:t>Trade-off entre Diversidade X Acurácia</a:t>
+            </a:r>
+          </a:p>
+          <a:p>
+            <a:r>
+              <a:rPr lang="pt-BR" dirty="0"/>
+              <a:t>Utilizar detectores distintos melhoram a diversidade, mas com os risco de degradar a capacidade de predição</a:t>
+            </a:r>
+          </a:p>
+          <a:p>
+            <a:r>
+              <a:rPr lang="pt-BR" dirty="0"/>
+              <a:t>Portanto um equilíbrio entre diversidade e acurácia deve ser mantido para se conseguir melhores resultados</a:t>
+            </a:r>
+          </a:p>
+          <a:p>
+            <a:r>
+              <a:rPr lang="pt-BR" dirty="0"/>
+              <a:t>Neste estudo, diferentes tipos de métodos não-supervisionados foram utilizados e seus parâmetros trocados para gerar uma maior variação</a:t>
+            </a:r>
+          </a:p>
+          <a:p>
+            <a:endParaRPr lang="pt-BR" dirty="0"/>
+          </a:p>
+        </p:txBody>
+      </p:sp>
+      <p:sp>
+        <p:nvSpPr>
           <p:cNvPr id="3" name="Espaço Reservado para Número de Slide 2"/>
           <p:cNvSpPr>
             <a:spLocks noGrp="1"/>
@@ -7379,50 +10599,22 @@
         </p:nvSpPr>
         <p:spPr/>
         <p:txBody>
-          <a:bodyPr/>
+          <a:bodyPr>
+            <a:normAutofit fontScale="90000"/>
+          </a:bodyPr>
           <a:lstStyle/>
           <a:p>
             <a:r>
               <a:rPr lang="pt-BR" dirty="0"/>
-              <a:t>Fase 2: Seleção TOS</a:t>
-            </a:r>
-          </a:p>
-        </p:txBody>
-      </p:sp>
-      <p:pic>
-        <p:nvPicPr>
-          <p:cNvPr id="5" name="Imagem 4"/>
-          <p:cNvPicPr>
-            <a:picLocks noChangeAspect="1"/>
-          </p:cNvPicPr>
-          <p:nvPr/>
-        </p:nvPicPr>
-        <p:blipFill>
-          <a:blip r:embed="rId2">
-            <a:extLst>
-              <a:ext uri="{28A0092B-C50C-407E-A947-70E740481C1C}">
-                <a14:useLocalDpi xmlns:a14="http://schemas.microsoft.com/office/drawing/2010/main" val="0"/>
-              </a:ext>
-            </a:extLst>
-          </a:blip>
-          <a:stretch>
-            <a:fillRect/>
-          </a:stretch>
-        </p:blipFill>
-        <p:spPr>
-          <a:xfrm>
-            <a:off x="2603786" y="2192958"/>
-            <a:ext cx="6984427" cy="3876110"/>
-          </a:xfrm>
-          <a:prstGeom prst="rect">
-            <a:avLst/>
-          </a:prstGeom>
-        </p:spPr>
-      </p:pic>
+              <a:t>Fase 1: Representação do Aprendizado não-supervisionado</a:t>
+            </a:r>
+          </a:p>
+        </p:txBody>
+      </p:sp>
     </p:spTree>
     <p:extLst>
       <p:ext uri="{BB962C8B-B14F-4D97-AF65-F5344CB8AC3E}">
-        <p14:creationId xmlns:p14="http://schemas.microsoft.com/office/powerpoint/2010/main" val="2286226953"/>
+        <p14:creationId xmlns:p14="http://schemas.microsoft.com/office/powerpoint/2010/main" val="2594379510"/>
       </p:ext>
     </p:extLst>
   </p:cSld>

</xml_diff>